<commit_message>
Add packaging and act part to presentation
</commit_message>
<xml_diff>
--- a/Präsentation1.pptx
+++ b/Präsentation1.pptx
@@ -5,12 +5,17 @@
     <p:sldMasterId id="2147483648" r:id="rId1"/>
   </p:sldMasterIdLst>
   <p:sldIdLst>
-    <p:sldId id="256" r:id="rId2"/>
-    <p:sldId id="260" r:id="rId3"/>
-    <p:sldId id="257" r:id="rId4"/>
-    <p:sldId id="258" r:id="rId5"/>
-    <p:sldId id="259" r:id="rId6"/>
-    <p:sldId id="261" r:id="rId7"/>
+    <p:sldId id="262" r:id="rId2"/>
+    <p:sldId id="263" r:id="rId3"/>
+    <p:sldId id="264" r:id="rId4"/>
+    <p:sldId id="266" r:id="rId5"/>
+    <p:sldId id="256" r:id="rId6"/>
+    <p:sldId id="260" r:id="rId7"/>
+    <p:sldId id="257" r:id="rId8"/>
+    <p:sldId id="258" r:id="rId9"/>
+    <p:sldId id="259" r:id="rId10"/>
+    <p:sldId id="261" r:id="rId11"/>
+    <p:sldId id="268" r:id="rId12"/>
   </p:sldIdLst>
   <p:sldSz cx="12192000" cy="6858000"/>
   <p:notesSz cx="6858000" cy="9144000"/>
@@ -410,7 +415,7 @@
           <a:p>
             <a:fld id="{7AE41885-4ED9-4654-941F-64B08A4B0B70}" type="datetimeFigureOut">
               <a:rPr lang="en-GB" smtClean="0"/>
-              <a:t>28/01/2025</a:t>
+              <a:t>29/01/2025</a:t>
             </a:fld>
             <a:endParaRPr lang="en-GB"/>
           </a:p>
@@ -610,7 +615,7 @@
           <a:p>
             <a:fld id="{7AE41885-4ED9-4654-941F-64B08A4B0B70}" type="datetimeFigureOut">
               <a:rPr lang="en-GB" smtClean="0"/>
-              <a:t>28/01/2025</a:t>
+              <a:t>29/01/2025</a:t>
             </a:fld>
             <a:endParaRPr lang="en-GB"/>
           </a:p>
@@ -820,7 +825,7 @@
           <a:p>
             <a:fld id="{7AE41885-4ED9-4654-941F-64B08A4B0B70}" type="datetimeFigureOut">
               <a:rPr lang="en-GB" smtClean="0"/>
-              <a:t>28/01/2025</a:t>
+              <a:t>29/01/2025</a:t>
             </a:fld>
             <a:endParaRPr lang="en-GB"/>
           </a:p>
@@ -1020,7 +1025,7 @@
           <a:p>
             <a:fld id="{7AE41885-4ED9-4654-941F-64B08A4B0B70}" type="datetimeFigureOut">
               <a:rPr lang="en-GB" smtClean="0"/>
-              <a:t>28/01/2025</a:t>
+              <a:t>29/01/2025</a:t>
             </a:fld>
             <a:endParaRPr lang="en-GB"/>
           </a:p>
@@ -1296,7 +1301,7 @@
           <a:p>
             <a:fld id="{7AE41885-4ED9-4654-941F-64B08A4B0B70}" type="datetimeFigureOut">
               <a:rPr lang="en-GB" smtClean="0"/>
-              <a:t>28/01/2025</a:t>
+              <a:t>29/01/2025</a:t>
             </a:fld>
             <a:endParaRPr lang="en-GB"/>
           </a:p>
@@ -1564,7 +1569,7 @@
           <a:p>
             <a:fld id="{7AE41885-4ED9-4654-941F-64B08A4B0B70}" type="datetimeFigureOut">
               <a:rPr lang="en-GB" smtClean="0"/>
-              <a:t>28/01/2025</a:t>
+              <a:t>29/01/2025</a:t>
             </a:fld>
             <a:endParaRPr lang="en-GB"/>
           </a:p>
@@ -1979,7 +1984,7 @@
           <a:p>
             <a:fld id="{7AE41885-4ED9-4654-941F-64B08A4B0B70}" type="datetimeFigureOut">
               <a:rPr lang="en-GB" smtClean="0"/>
-              <a:t>28/01/2025</a:t>
+              <a:t>29/01/2025</a:t>
             </a:fld>
             <a:endParaRPr lang="en-GB"/>
           </a:p>
@@ -2121,7 +2126,7 @@
           <a:p>
             <a:fld id="{7AE41885-4ED9-4654-941F-64B08A4B0B70}" type="datetimeFigureOut">
               <a:rPr lang="en-GB" smtClean="0"/>
-              <a:t>28/01/2025</a:t>
+              <a:t>29/01/2025</a:t>
             </a:fld>
             <a:endParaRPr lang="en-GB"/>
           </a:p>
@@ -2234,7 +2239,7 @@
           <a:p>
             <a:fld id="{7AE41885-4ED9-4654-941F-64B08A4B0B70}" type="datetimeFigureOut">
               <a:rPr lang="en-GB" smtClean="0"/>
-              <a:t>28/01/2025</a:t>
+              <a:t>29/01/2025</a:t>
             </a:fld>
             <a:endParaRPr lang="en-GB"/>
           </a:p>
@@ -2547,7 +2552,7 @@
           <a:p>
             <a:fld id="{7AE41885-4ED9-4654-941F-64B08A4B0B70}" type="datetimeFigureOut">
               <a:rPr lang="en-GB" smtClean="0"/>
-              <a:t>28/01/2025</a:t>
+              <a:t>29/01/2025</a:t>
             </a:fld>
             <a:endParaRPr lang="en-GB"/>
           </a:p>
@@ -2836,7 +2841,7 @@
           <a:p>
             <a:fld id="{7AE41885-4ED9-4654-941F-64B08A4B0B70}" type="datetimeFigureOut">
               <a:rPr lang="en-GB" smtClean="0"/>
-              <a:t>28/01/2025</a:t>
+              <a:t>29/01/2025</a:t>
             </a:fld>
             <a:endParaRPr lang="en-GB"/>
           </a:p>
@@ -3079,7 +3084,7 @@
           <a:p>
             <a:fld id="{7AE41885-4ED9-4654-941F-64B08A4B0B70}" type="datetimeFigureOut">
               <a:rPr lang="en-GB" smtClean="0"/>
-              <a:t>28/01/2025</a:t>
+              <a:t>29/01/2025</a:t>
             </a:fld>
             <a:endParaRPr lang="en-GB"/>
           </a:p>
@@ -3496,84 +3501,850 @@
           <a:chExt cx="0" cy="0"/>
         </a:xfrm>
       </p:grpSpPr>
-      <p:sp>
-        <p:nvSpPr>
-          <p:cNvPr id="4" name="Titel 3">
-            <a:extLst>
-              <a:ext uri="{FF2B5EF4-FFF2-40B4-BE49-F238E27FC236}">
-                <a16:creationId xmlns:a16="http://schemas.microsoft.com/office/drawing/2014/main" id="{A1F11745-60F8-F9E6-DE39-64814F034EAF}"/>
-              </a:ext>
-            </a:extLst>
-          </p:cNvPr>
-          <p:cNvSpPr>
-            <a:spLocks noGrp="1"/>
-          </p:cNvSpPr>
-          <p:nvPr>
-            <p:ph type="title"/>
-          </p:nvPr>
-        </p:nvSpPr>
-        <p:spPr/>
-        <p:txBody>
-          <a:bodyPr/>
-          <a:lstStyle/>
-          <a:p>
-            <a:r>
-              <a:rPr lang="de-DE" dirty="0"/>
-              <a:t>Workflows in GitHub Actions</a:t>
-            </a:r>
-            <a:endParaRPr lang="en-GB" dirty="0"/>
-          </a:p>
-        </p:txBody>
-      </p:sp>
       <p:pic>
         <p:nvPicPr>
-          <p:cNvPr id="7" name="Inhaltsplatzhalter 6" descr="Ein Bild, das Text, Schrift, Zahl, Screenshot enthält.&#10;&#10;Automatisch generierte Beschreibung">
-            <a:extLst>
-              <a:ext uri="{FF2B5EF4-FFF2-40B4-BE49-F238E27FC236}">
-                <a16:creationId xmlns:a16="http://schemas.microsoft.com/office/drawing/2014/main" id="{1CCE5D11-C595-AE5D-1C76-13E7418FC604}"/>
+          <p:cNvPr id="5" name="Grafik 4">
+            <a:extLst>
+              <a:ext uri="{FF2B5EF4-FFF2-40B4-BE49-F238E27FC236}">
+                <a16:creationId xmlns:a16="http://schemas.microsoft.com/office/drawing/2014/main" id="{814FB14C-5810-1719-7F67-0CAC108CEC19}"/>
               </a:ext>
             </a:extLst>
           </p:cNvPr>
           <p:cNvPicPr>
-            <a:picLocks noGrp="1" noChangeAspect="1"/>
+            <a:picLocks noChangeAspect="1"/>
           </p:cNvPicPr>
-          <p:nvPr>
-            <p:ph idx="1"/>
-          </p:nvPr>
+          <p:nvPr/>
         </p:nvPicPr>
         <p:blipFill>
-          <a:blip r:embed="rId2">
-            <a:extLst>
-              <a:ext uri="{28A0092B-C50C-407E-A947-70E740481C1C}">
-                <a14:useLocalDpi xmlns:a14="http://schemas.microsoft.com/office/drawing/2010/main" val="0"/>
-              </a:ext>
-            </a:extLst>
-          </a:blip>
+          <a:blip r:embed="rId2"/>
           <a:stretch>
             <a:fillRect/>
           </a:stretch>
         </p:blipFill>
         <p:spPr>
           <a:xfrm>
-            <a:off x="4284572" y="1423646"/>
-            <a:ext cx="7646873" cy="2676406"/>
+            <a:off x="0" y="-1781"/>
+            <a:ext cx="4023867" cy="2517058"/>
+          </a:xfrm>
+          <a:prstGeom prst="rect">
+            <a:avLst/>
+          </a:prstGeom>
+        </p:spPr>
+      </p:pic>
+      <p:sp>
+        <p:nvSpPr>
+          <p:cNvPr id="2" name="Titel 1">
+            <a:extLst>
+              <a:ext uri="{FF2B5EF4-FFF2-40B4-BE49-F238E27FC236}">
+                <a16:creationId xmlns:a16="http://schemas.microsoft.com/office/drawing/2014/main" id="{F17500D6-019C-5BBC-3E30-BDF364FD6B89}"/>
+              </a:ext>
+            </a:extLst>
+          </p:cNvPr>
+          <p:cNvSpPr>
+            <a:spLocks noGrp="1"/>
+          </p:cNvSpPr>
+          <p:nvPr>
+            <p:ph type="title"/>
+          </p:nvPr>
+        </p:nvSpPr>
+        <p:spPr>
+          <a:xfrm>
+            <a:off x="503252" y="248602"/>
+            <a:ext cx="10515600" cy="1325563"/>
           </a:xfrm>
         </p:spPr>
+        <p:txBody>
+          <a:bodyPr>
+            <a:normAutofit/>
+          </a:bodyPr>
+          <a:lstStyle/>
+          <a:p>
+            <a:r>
+              <a:rPr lang="de-DE" sz="5400" b="1" dirty="0" err="1"/>
+              <a:t>Improve</a:t>
+            </a:r>
+            <a:r>
+              <a:rPr lang="de-DE" sz="5400" b="1" dirty="0"/>
+              <a:t> </a:t>
+            </a:r>
+            <a:r>
+              <a:rPr lang="de-DE" sz="5400" b="1" dirty="0" err="1"/>
+              <a:t>project</a:t>
+            </a:r>
+            <a:r>
+              <a:rPr lang="de-DE" sz="5400" b="1" dirty="0"/>
+              <a:t> </a:t>
+            </a:r>
+            <a:r>
+              <a:rPr lang="de-DE" sz="5400" b="1" dirty="0" err="1"/>
+              <a:t>environment</a:t>
+            </a:r>
+            <a:endParaRPr lang="de-AT" sz="5400" b="1" dirty="0"/>
+          </a:p>
+        </p:txBody>
+      </p:sp>
+      <p:pic>
+        <p:nvPicPr>
+          <p:cNvPr id="1026" name="Picture 2" descr="Present package gift, emotions. - PICRYL - Public Domain Media Search  Engine Public Domain Image">
+            <a:extLst>
+              <a:ext uri="{FF2B5EF4-FFF2-40B4-BE49-F238E27FC236}">
+                <a16:creationId xmlns:a16="http://schemas.microsoft.com/office/drawing/2014/main" id="{78C9816E-70AF-B316-44D2-629CDC2C55D3}"/>
+              </a:ext>
+            </a:extLst>
+          </p:cNvPr>
+          <p:cNvPicPr>
+            <a:picLocks noChangeAspect="1" noChangeArrowheads="1"/>
+          </p:cNvPicPr>
+          <p:nvPr/>
+        </p:nvPicPr>
+        <p:blipFill rotWithShape="1">
+          <a:blip r:embed="rId3">
+            <a:extLst>
+              <a:ext uri="{BEBA8EAE-BF5A-486C-A8C5-ECC9F3942E4B}">
+                <a14:imgProps xmlns:a14="http://schemas.microsoft.com/office/drawing/2010/main">
+                  <a14:imgLayer r:embed="rId4">
+                    <a14:imgEffect>
+                      <a14:brightnessContrast bright="20000" contrast="-40000"/>
+                    </a14:imgEffect>
+                  </a14:imgLayer>
+                </a14:imgProps>
+              </a:ext>
+              <a:ext uri="{28A0092B-C50C-407E-A947-70E740481C1C}">
+                <a14:useLocalDpi xmlns:a14="http://schemas.microsoft.com/office/drawing/2010/main" val="0"/>
+              </a:ext>
+            </a:extLst>
+          </a:blip>
+          <a:srcRect l="18676" t="14989" r="12699" b="17081"/>
+          <a:stretch/>
+        </p:blipFill>
+        <p:spPr bwMode="auto">
+          <a:xfrm>
+            <a:off x="670396" y="3350410"/>
+            <a:ext cx="4768646" cy="2830359"/>
+          </a:xfrm>
+          <a:prstGeom prst="rect">
+            <a:avLst/>
+          </a:prstGeom>
+          <a:noFill/>
+          <a:extLst>
+            <a:ext uri="{909E8E84-426E-40DD-AFC4-6F175D3DCCD1}">
+              <a14:hiddenFill xmlns:a14="http://schemas.microsoft.com/office/drawing/2010/main">
+                <a:solidFill>
+                  <a:srgbClr val="FFFFFF"/>
+                </a:solidFill>
+              </a14:hiddenFill>
+            </a:ext>
+          </a:extLst>
+        </p:spPr>
       </p:pic>
+      <p:sp>
+        <p:nvSpPr>
+          <p:cNvPr id="8" name="Textfeld 7">
+            <a:extLst>
+              <a:ext uri="{FF2B5EF4-FFF2-40B4-BE49-F238E27FC236}">
+                <a16:creationId xmlns:a16="http://schemas.microsoft.com/office/drawing/2014/main" id="{606B4C11-3387-1B56-49C4-F632C626A637}"/>
+              </a:ext>
+            </a:extLst>
+          </p:cNvPr>
+          <p:cNvSpPr txBox="1"/>
+          <p:nvPr/>
+        </p:nvSpPr>
+        <p:spPr>
+          <a:xfrm>
+            <a:off x="503252" y="2580969"/>
+            <a:ext cx="5112774" cy="769441"/>
+          </a:xfrm>
+          <a:prstGeom prst="rect">
+            <a:avLst/>
+          </a:prstGeom>
+          <a:noFill/>
+        </p:spPr>
+        <p:txBody>
+          <a:bodyPr wrap="square" rtlCol="0">
+            <a:spAutoFit/>
+          </a:bodyPr>
+          <a:lstStyle/>
+          <a:p>
+            <a:r>
+              <a:rPr lang="de-DE" sz="4400" dirty="0" err="1">
+                <a:latin typeface="+mj-lt"/>
+                <a:ea typeface="+mj-ea"/>
+                <a:cs typeface="+mj-cs"/>
+              </a:rPr>
+              <a:t>Packaging</a:t>
+            </a:r>
+            <a:r>
+              <a:rPr lang="de-DE" sz="4400" dirty="0">
+                <a:latin typeface="+mj-lt"/>
+                <a:ea typeface="+mj-ea"/>
+                <a:cs typeface="+mj-cs"/>
+              </a:rPr>
+              <a:t> </a:t>
+            </a:r>
+            <a:r>
+              <a:rPr lang="de-DE" sz="4400" dirty="0" err="1">
+                <a:latin typeface="+mj-lt"/>
+                <a:ea typeface="+mj-ea"/>
+                <a:cs typeface="+mj-cs"/>
+              </a:rPr>
+              <a:t>the</a:t>
+            </a:r>
+            <a:r>
+              <a:rPr lang="de-DE" sz="4400" dirty="0">
+                <a:latin typeface="+mj-lt"/>
+                <a:ea typeface="+mj-ea"/>
+                <a:cs typeface="+mj-cs"/>
+              </a:rPr>
+              <a:t> </a:t>
+            </a:r>
+            <a:r>
+              <a:rPr lang="de-DE" sz="4400" dirty="0" err="1">
+                <a:latin typeface="+mj-lt"/>
+                <a:ea typeface="+mj-ea"/>
+                <a:cs typeface="+mj-cs"/>
+              </a:rPr>
+              <a:t>project</a:t>
+            </a:r>
+            <a:endParaRPr lang="de-AT" sz="4400" dirty="0">
+              <a:latin typeface="+mj-lt"/>
+              <a:ea typeface="+mj-ea"/>
+              <a:cs typeface="+mj-cs"/>
+            </a:endParaRPr>
+          </a:p>
+        </p:txBody>
+      </p:sp>
+      <p:sp>
+        <p:nvSpPr>
+          <p:cNvPr id="11" name="Textfeld 10">
+            <a:extLst>
+              <a:ext uri="{FF2B5EF4-FFF2-40B4-BE49-F238E27FC236}">
+                <a16:creationId xmlns:a16="http://schemas.microsoft.com/office/drawing/2014/main" id="{A0F2087A-5C81-6FAE-5E46-10D656B61B2B}"/>
+              </a:ext>
+            </a:extLst>
+          </p:cNvPr>
+          <p:cNvSpPr txBox="1"/>
+          <p:nvPr/>
+        </p:nvSpPr>
+        <p:spPr>
+          <a:xfrm>
+            <a:off x="6140835" y="1499581"/>
+            <a:ext cx="2925748" cy="1446550"/>
+          </a:xfrm>
+          <a:prstGeom prst="rect">
+            <a:avLst/>
+          </a:prstGeom>
+          <a:noFill/>
+        </p:spPr>
+        <p:txBody>
+          <a:bodyPr wrap="square" rtlCol="0">
+            <a:spAutoFit/>
+          </a:bodyPr>
+          <a:lstStyle/>
+          <a:p>
+            <a:r>
+              <a:rPr lang="de-DE" sz="4400" dirty="0" err="1">
+                <a:latin typeface="+mj-lt"/>
+                <a:ea typeface="+mj-ea"/>
+                <a:cs typeface="+mj-cs"/>
+              </a:rPr>
+              <a:t>Continuous</a:t>
+            </a:r>
+            <a:r>
+              <a:rPr lang="de-DE" sz="4400" dirty="0">
+                <a:latin typeface="+mj-lt"/>
+                <a:ea typeface="+mj-ea"/>
+                <a:cs typeface="+mj-cs"/>
+              </a:rPr>
+              <a:t> </a:t>
+            </a:r>
+            <a:r>
+              <a:rPr lang="de-DE" sz="4400" dirty="0" err="1">
+                <a:latin typeface="+mj-lt"/>
+                <a:ea typeface="+mj-ea"/>
+                <a:cs typeface="+mj-cs"/>
+              </a:rPr>
+              <a:t>integration</a:t>
+            </a:r>
+            <a:endParaRPr lang="de-AT" sz="4400" dirty="0">
+              <a:latin typeface="+mj-lt"/>
+              <a:ea typeface="+mj-ea"/>
+              <a:cs typeface="+mj-cs"/>
+            </a:endParaRPr>
+          </a:p>
+        </p:txBody>
+      </p:sp>
+      <p:grpSp>
+        <p:nvGrpSpPr>
+          <p:cNvPr id="24" name="Gruppieren 23">
+            <a:extLst>
+              <a:ext uri="{FF2B5EF4-FFF2-40B4-BE49-F238E27FC236}">
+                <a16:creationId xmlns:a16="http://schemas.microsoft.com/office/drawing/2014/main" id="{553A7BF3-B8A7-9C35-2BED-CD2C825C7F1A}"/>
+              </a:ext>
+            </a:extLst>
+          </p:cNvPr>
+          <p:cNvGrpSpPr/>
+          <p:nvPr/>
+        </p:nvGrpSpPr>
+        <p:grpSpPr>
+          <a:xfrm>
+            <a:off x="6646838" y="1346841"/>
+            <a:ext cx="5545162" cy="5480662"/>
+            <a:chOff x="6646838" y="1346841"/>
+            <a:chExt cx="5545162" cy="5480662"/>
+          </a:xfrm>
+        </p:grpSpPr>
+        <p:pic>
+          <p:nvPicPr>
+            <p:cNvPr id="7" name="Grafik 6">
+              <a:extLst>
+                <a:ext uri="{FF2B5EF4-FFF2-40B4-BE49-F238E27FC236}">
+                  <a16:creationId xmlns:a16="http://schemas.microsoft.com/office/drawing/2014/main" id="{063065E9-5765-0BB3-5795-A3A0212007AF}"/>
+                </a:ext>
+              </a:extLst>
+            </p:cNvPr>
+            <p:cNvPicPr>
+              <a:picLocks noChangeAspect="1"/>
+            </p:cNvPicPr>
+            <p:nvPr/>
+          </p:nvPicPr>
+          <p:blipFill>
+            <a:blip r:embed="rId5"/>
+            <a:stretch>
+              <a:fillRect/>
+            </a:stretch>
+          </p:blipFill>
+          <p:spPr>
+            <a:xfrm>
+              <a:off x="6646838" y="3660361"/>
+              <a:ext cx="2210456" cy="2210456"/>
+            </a:xfrm>
+            <a:prstGeom prst="rect">
+              <a:avLst/>
+            </a:prstGeom>
+          </p:spPr>
+        </p:pic>
+        <p:pic>
+          <p:nvPicPr>
+            <p:cNvPr id="1030" name="Picture 6" descr="Free Images : programmer, computer, progress, silhouette, man, developer,  software, programming, cody, concept, sitting, development, testing, web,  internet, technology, language, engineer, code, source, sit, script,  project, work, tester, wheel, font ...">
+              <a:extLst>
+                <a:ext uri="{FF2B5EF4-FFF2-40B4-BE49-F238E27FC236}">
+                  <a16:creationId xmlns:a16="http://schemas.microsoft.com/office/drawing/2014/main" id="{BE02CA45-ABC7-8631-A6AA-5028D1D69974}"/>
+                </a:ext>
+              </a:extLst>
+            </p:cNvPr>
+            <p:cNvPicPr>
+              <a:picLocks noChangeAspect="1" noChangeArrowheads="1"/>
+            </p:cNvPicPr>
+            <p:nvPr/>
+          </p:nvPicPr>
+          <p:blipFill>
+            <a:blip r:embed="rId6">
+              <a:extLst>
+                <a:ext uri="{28A0092B-C50C-407E-A947-70E740481C1C}">
+                  <a14:useLocalDpi xmlns:a14="http://schemas.microsoft.com/office/drawing/2010/main" val="0"/>
+                </a:ext>
+              </a:extLst>
+            </a:blip>
+            <a:srcRect/>
+            <a:stretch>
+              <a:fillRect/>
+            </a:stretch>
+          </p:blipFill>
+          <p:spPr bwMode="auto">
+            <a:xfrm>
+              <a:off x="8883368" y="1346841"/>
+              <a:ext cx="3308632" cy="2242113"/>
+            </a:xfrm>
+            <a:prstGeom prst="rect">
+              <a:avLst/>
+            </a:prstGeom>
+            <a:noFill/>
+            <a:extLst>
+              <a:ext uri="{909E8E84-426E-40DD-AFC4-6F175D3DCCD1}">
+                <a14:hiddenFill xmlns:a14="http://schemas.microsoft.com/office/drawing/2010/main">
+                  <a:solidFill>
+                    <a:srgbClr val="FFFFFF"/>
+                  </a:solidFill>
+                </a14:hiddenFill>
+              </a:ext>
+            </a:extLst>
+          </p:spPr>
+        </p:pic>
+        <p:pic>
+          <p:nvPicPr>
+            <p:cNvPr id="10" name="Grafik 9">
+              <a:extLst>
+                <a:ext uri="{FF2B5EF4-FFF2-40B4-BE49-F238E27FC236}">
+                  <a16:creationId xmlns:a16="http://schemas.microsoft.com/office/drawing/2014/main" id="{16329A99-34FF-DD28-C69B-C6D9BC8CF9AB}"/>
+                </a:ext>
+              </a:extLst>
+            </p:cNvPr>
+            <p:cNvPicPr>
+              <a:picLocks noChangeAspect="1"/>
+            </p:cNvPicPr>
+            <p:nvPr/>
+          </p:nvPicPr>
+          <p:blipFill>
+            <a:blip r:embed="rId7"/>
+            <a:stretch>
+              <a:fillRect/>
+            </a:stretch>
+          </p:blipFill>
+          <p:spPr>
+            <a:xfrm>
+              <a:off x="9580997" y="4914130"/>
+              <a:ext cx="1913373" cy="1913373"/>
+            </a:xfrm>
+            <a:prstGeom prst="rect">
+              <a:avLst/>
+            </a:prstGeom>
+          </p:spPr>
+        </p:pic>
+        <p:sp>
+          <p:nvSpPr>
+            <p:cNvPr id="16" name="Pfeil: gebogen 15">
+              <a:extLst>
+                <a:ext uri="{FF2B5EF4-FFF2-40B4-BE49-F238E27FC236}">
+                  <a16:creationId xmlns:a16="http://schemas.microsoft.com/office/drawing/2014/main" id="{9DD9C008-37FB-9D4E-4A9F-8F6B9DF81DB4}"/>
+                </a:ext>
+              </a:extLst>
+            </p:cNvPr>
+            <p:cNvSpPr/>
+            <p:nvPr/>
+          </p:nvSpPr>
+          <p:spPr>
+            <a:xfrm rot="16200000" flipH="1">
+              <a:off x="8125048" y="2676544"/>
+              <a:ext cx="1146758" cy="1586583"/>
+            </a:xfrm>
+            <a:prstGeom prst="bentArrow">
+              <a:avLst>
+                <a:gd name="adj1" fmla="val 15484"/>
+                <a:gd name="adj2" fmla="val 25000"/>
+                <a:gd name="adj3" fmla="val 25000"/>
+                <a:gd name="adj4" fmla="val 82742"/>
+              </a:avLst>
+            </a:prstGeom>
+            <a:solidFill>
+              <a:srgbClr val="FF0000"/>
+            </a:solidFill>
+            <a:ln>
+              <a:solidFill>
+                <a:schemeClr val="tx1"/>
+              </a:solidFill>
+            </a:ln>
+          </p:spPr>
+          <p:style>
+            <a:lnRef idx="2">
+              <a:schemeClr val="accent1">
+                <a:shade val="15000"/>
+              </a:schemeClr>
+            </a:lnRef>
+            <a:fillRef idx="1">
+              <a:schemeClr val="accent1"/>
+            </a:fillRef>
+            <a:effectRef idx="0">
+              <a:schemeClr val="accent1"/>
+            </a:effectRef>
+            <a:fontRef idx="minor">
+              <a:schemeClr val="lt1"/>
+            </a:fontRef>
+          </p:style>
+          <p:txBody>
+            <a:bodyPr rtlCol="0" anchor="ctr"/>
+            <a:lstStyle/>
+            <a:p>
+              <a:pPr algn="ctr"/>
+              <a:endParaRPr lang="de-AT" dirty="0">
+                <a:solidFill>
+                  <a:schemeClr val="tx1"/>
+                </a:solidFill>
+              </a:endParaRPr>
+            </a:p>
+          </p:txBody>
+        </p:sp>
+        <p:sp>
+          <p:nvSpPr>
+            <p:cNvPr id="17" name="Pfeil: gebogen 16">
+              <a:extLst>
+                <a:ext uri="{FF2B5EF4-FFF2-40B4-BE49-F238E27FC236}">
+                  <a16:creationId xmlns:a16="http://schemas.microsoft.com/office/drawing/2014/main" id="{30E6F473-8F7C-5ABF-215A-A248324CA8E6}"/>
+                </a:ext>
+              </a:extLst>
+            </p:cNvPr>
+            <p:cNvSpPr/>
+            <p:nvPr/>
+          </p:nvSpPr>
+          <p:spPr>
+            <a:xfrm rot="10800000" flipH="1">
+              <a:off x="8099929" y="5461999"/>
+              <a:ext cx="1481068" cy="1146758"/>
+            </a:xfrm>
+            <a:prstGeom prst="bentArrow">
+              <a:avLst>
+                <a:gd name="adj1" fmla="val 15484"/>
+                <a:gd name="adj2" fmla="val 25000"/>
+                <a:gd name="adj3" fmla="val 25000"/>
+                <a:gd name="adj4" fmla="val 82742"/>
+              </a:avLst>
+            </a:prstGeom>
+            <a:solidFill>
+              <a:srgbClr val="00B050"/>
+            </a:solidFill>
+            <a:ln>
+              <a:solidFill>
+                <a:schemeClr val="tx1"/>
+              </a:solidFill>
+            </a:ln>
+          </p:spPr>
+          <p:style>
+            <a:lnRef idx="2">
+              <a:schemeClr val="accent1">
+                <a:shade val="15000"/>
+              </a:schemeClr>
+            </a:lnRef>
+            <a:fillRef idx="1">
+              <a:schemeClr val="accent1"/>
+            </a:fillRef>
+            <a:effectRef idx="0">
+              <a:schemeClr val="accent1"/>
+            </a:effectRef>
+            <a:fontRef idx="minor">
+              <a:schemeClr val="lt1"/>
+            </a:fontRef>
+          </p:style>
+          <p:txBody>
+            <a:bodyPr rtlCol="0" anchor="ctr"/>
+            <a:lstStyle/>
+            <a:p>
+              <a:pPr algn="ctr"/>
+              <a:endParaRPr lang="de-AT" dirty="0">
+                <a:solidFill>
+                  <a:schemeClr val="tx1"/>
+                </a:solidFill>
+              </a:endParaRPr>
+            </a:p>
+          </p:txBody>
+        </p:sp>
+        <p:sp>
+          <p:nvSpPr>
+            <p:cNvPr id="18" name="Pfeil: gebogen 17">
+              <a:extLst>
+                <a:ext uri="{FF2B5EF4-FFF2-40B4-BE49-F238E27FC236}">
+                  <a16:creationId xmlns:a16="http://schemas.microsoft.com/office/drawing/2014/main" id="{2D3A7AC7-CBA5-9F60-A94C-F6C1FB079787}"/>
+                </a:ext>
+              </a:extLst>
+            </p:cNvPr>
+            <p:cNvSpPr/>
+            <p:nvPr/>
+          </p:nvSpPr>
+          <p:spPr>
+            <a:xfrm rot="556800" flipH="1">
+              <a:off x="8509514" y="4702997"/>
+              <a:ext cx="1481068" cy="1146758"/>
+            </a:xfrm>
+            <a:prstGeom prst="bentArrow">
+              <a:avLst>
+                <a:gd name="adj1" fmla="val 15484"/>
+                <a:gd name="adj2" fmla="val 25000"/>
+                <a:gd name="adj3" fmla="val 25000"/>
+                <a:gd name="adj4" fmla="val 82742"/>
+              </a:avLst>
+            </a:prstGeom>
+            <a:solidFill>
+              <a:srgbClr val="00B050"/>
+            </a:solidFill>
+            <a:ln>
+              <a:solidFill>
+                <a:schemeClr val="tx1"/>
+              </a:solidFill>
+            </a:ln>
+          </p:spPr>
+          <p:style>
+            <a:lnRef idx="2">
+              <a:schemeClr val="accent1">
+                <a:shade val="15000"/>
+              </a:schemeClr>
+            </a:lnRef>
+            <a:fillRef idx="1">
+              <a:schemeClr val="accent1"/>
+            </a:fillRef>
+            <a:effectRef idx="0">
+              <a:schemeClr val="accent1"/>
+            </a:effectRef>
+            <a:fontRef idx="minor">
+              <a:schemeClr val="lt1"/>
+            </a:fontRef>
+          </p:style>
+          <p:txBody>
+            <a:bodyPr rtlCol="0" anchor="ctr"/>
+            <a:lstStyle/>
+            <a:p>
+              <a:pPr algn="ctr"/>
+              <a:endParaRPr lang="de-AT" dirty="0">
+                <a:solidFill>
+                  <a:schemeClr val="tx1"/>
+                </a:solidFill>
+              </a:endParaRPr>
+            </a:p>
+          </p:txBody>
+        </p:sp>
+        <p:sp>
+          <p:nvSpPr>
+            <p:cNvPr id="20" name="Pfeil: gebogen 19">
+              <a:extLst>
+                <a:ext uri="{FF2B5EF4-FFF2-40B4-BE49-F238E27FC236}">
+                  <a16:creationId xmlns:a16="http://schemas.microsoft.com/office/drawing/2014/main" id="{98480519-1415-1827-5585-5FDEEAECAD5B}"/>
+                </a:ext>
+              </a:extLst>
+            </p:cNvPr>
+            <p:cNvSpPr/>
+            <p:nvPr/>
+          </p:nvSpPr>
+          <p:spPr>
+            <a:xfrm rot="5400000" flipH="1">
+              <a:off x="8891944" y="3061074"/>
+              <a:ext cx="1146758" cy="1586583"/>
+            </a:xfrm>
+            <a:prstGeom prst="bentArrow">
+              <a:avLst>
+                <a:gd name="adj1" fmla="val 15484"/>
+                <a:gd name="adj2" fmla="val 25000"/>
+                <a:gd name="adj3" fmla="val 25000"/>
+                <a:gd name="adj4" fmla="val 82742"/>
+              </a:avLst>
+            </a:prstGeom>
+            <a:solidFill>
+              <a:srgbClr val="FF0000"/>
+            </a:solidFill>
+            <a:ln>
+              <a:solidFill>
+                <a:schemeClr val="tx1"/>
+              </a:solidFill>
+            </a:ln>
+          </p:spPr>
+          <p:style>
+            <a:lnRef idx="2">
+              <a:schemeClr val="accent1">
+                <a:shade val="15000"/>
+              </a:schemeClr>
+            </a:lnRef>
+            <a:fillRef idx="1">
+              <a:schemeClr val="accent1"/>
+            </a:fillRef>
+            <a:effectRef idx="0">
+              <a:schemeClr val="accent1"/>
+            </a:effectRef>
+            <a:fontRef idx="minor">
+              <a:schemeClr val="lt1"/>
+            </a:fontRef>
+          </p:style>
+          <p:txBody>
+            <a:bodyPr rtlCol="0" anchor="ctr"/>
+            <a:lstStyle/>
+            <a:p>
+              <a:pPr algn="ctr"/>
+              <a:endParaRPr lang="de-AT" dirty="0">
+                <a:solidFill>
+                  <a:schemeClr val="tx1"/>
+                </a:solidFill>
+              </a:endParaRPr>
+            </a:p>
+          </p:txBody>
+        </p:sp>
+      </p:grpSp>
     </p:spTree>
     <p:extLst>
       <p:ext uri="{BB962C8B-B14F-4D97-AF65-F5344CB8AC3E}">
-        <p14:creationId xmlns:p14="http://schemas.microsoft.com/office/powerpoint/2010/main" val="1191672264"/>
+        <p14:creationId xmlns:p14="http://schemas.microsoft.com/office/powerpoint/2010/main" val="439811885"/>
       </p:ext>
     </p:extLst>
   </p:cSld>
   <p:clrMapOvr>
     <a:masterClrMapping/>
   </p:clrMapOvr>
+  <p:timing>
+    <p:tnLst>
+      <p:par>
+        <p:cTn id="1" dur="indefinite" restart="never" nodeType="tmRoot">
+          <p:childTnLst>
+            <p:seq concurrent="1" nextAc="seek">
+              <p:cTn id="2" dur="indefinite" nodeType="mainSeq">
+                <p:childTnLst>
+                  <p:par>
+                    <p:cTn id="3" fill="hold">
+                      <p:stCondLst>
+                        <p:cond delay="indefinite"/>
+                      </p:stCondLst>
+                      <p:childTnLst>
+                        <p:par>
+                          <p:cTn id="4" fill="hold">
+                            <p:stCondLst>
+                              <p:cond delay="0"/>
+                            </p:stCondLst>
+                            <p:childTnLst>
+                              <p:par>
+                                <p:cTn id="5" presetID="1" presetClass="entr" presetSubtype="0" fill="hold" grpId="0" nodeType="clickEffect">
+                                  <p:stCondLst>
+                                    <p:cond delay="0"/>
+                                  </p:stCondLst>
+                                  <p:childTnLst>
+                                    <p:set>
+                                      <p:cBhvr>
+                                        <p:cTn id="6" dur="1" fill="hold">
+                                          <p:stCondLst>
+                                            <p:cond delay="0"/>
+                                          </p:stCondLst>
+                                        </p:cTn>
+                                        <p:tgtEl>
+                                          <p:spTgt spid="8"/>
+                                        </p:tgtEl>
+                                        <p:attrNameLst>
+                                          <p:attrName>style.visibility</p:attrName>
+                                        </p:attrNameLst>
+                                      </p:cBhvr>
+                                      <p:to>
+                                        <p:strVal val="visible"/>
+                                      </p:to>
+                                    </p:set>
+                                  </p:childTnLst>
+                                </p:cTn>
+                              </p:par>
+                              <p:par>
+                                <p:cTn id="7" presetID="1" presetClass="entr" presetSubtype="0" fill="hold" nodeType="withEffect">
+                                  <p:stCondLst>
+                                    <p:cond delay="0"/>
+                                  </p:stCondLst>
+                                  <p:childTnLst>
+                                    <p:set>
+                                      <p:cBhvr>
+                                        <p:cTn id="8" dur="1" fill="hold">
+                                          <p:stCondLst>
+                                            <p:cond delay="0"/>
+                                          </p:stCondLst>
+                                        </p:cTn>
+                                        <p:tgtEl>
+                                          <p:spTgt spid="1026"/>
+                                        </p:tgtEl>
+                                        <p:attrNameLst>
+                                          <p:attrName>style.visibility</p:attrName>
+                                        </p:attrNameLst>
+                                      </p:cBhvr>
+                                      <p:to>
+                                        <p:strVal val="visible"/>
+                                      </p:to>
+                                    </p:set>
+                                  </p:childTnLst>
+                                </p:cTn>
+                              </p:par>
+                            </p:childTnLst>
+                          </p:cTn>
+                        </p:par>
+                      </p:childTnLst>
+                    </p:cTn>
+                  </p:par>
+                  <p:par>
+                    <p:cTn id="9" fill="hold">
+                      <p:stCondLst>
+                        <p:cond delay="indefinite"/>
+                      </p:stCondLst>
+                      <p:childTnLst>
+                        <p:par>
+                          <p:cTn id="10" fill="hold">
+                            <p:stCondLst>
+                              <p:cond delay="0"/>
+                            </p:stCondLst>
+                            <p:childTnLst>
+                              <p:par>
+                                <p:cTn id="11" presetID="1" presetClass="entr" presetSubtype="0" fill="hold" grpId="0" nodeType="clickEffect">
+                                  <p:stCondLst>
+                                    <p:cond delay="0"/>
+                                  </p:stCondLst>
+                                  <p:childTnLst>
+                                    <p:set>
+                                      <p:cBhvr>
+                                        <p:cTn id="12" dur="1" fill="hold">
+                                          <p:stCondLst>
+                                            <p:cond delay="0"/>
+                                          </p:stCondLst>
+                                        </p:cTn>
+                                        <p:tgtEl>
+                                          <p:spTgt spid="11"/>
+                                        </p:tgtEl>
+                                        <p:attrNameLst>
+                                          <p:attrName>style.visibility</p:attrName>
+                                        </p:attrNameLst>
+                                      </p:cBhvr>
+                                      <p:to>
+                                        <p:strVal val="visible"/>
+                                      </p:to>
+                                    </p:set>
+                                  </p:childTnLst>
+                                </p:cTn>
+                              </p:par>
+                              <p:par>
+                                <p:cTn id="13" presetID="1" presetClass="entr" presetSubtype="0" fill="hold" nodeType="withEffect">
+                                  <p:stCondLst>
+                                    <p:cond delay="0"/>
+                                  </p:stCondLst>
+                                  <p:childTnLst>
+                                    <p:set>
+                                      <p:cBhvr>
+                                        <p:cTn id="14" dur="1" fill="hold">
+                                          <p:stCondLst>
+                                            <p:cond delay="0"/>
+                                          </p:stCondLst>
+                                        </p:cTn>
+                                        <p:tgtEl>
+                                          <p:spTgt spid="24"/>
+                                        </p:tgtEl>
+                                        <p:attrNameLst>
+                                          <p:attrName>style.visibility</p:attrName>
+                                        </p:attrNameLst>
+                                      </p:cBhvr>
+                                      <p:to>
+                                        <p:strVal val="visible"/>
+                                      </p:to>
+                                    </p:set>
+                                  </p:childTnLst>
+                                </p:cTn>
+                              </p:par>
+                            </p:childTnLst>
+                          </p:cTn>
+                        </p:par>
+                      </p:childTnLst>
+                    </p:cTn>
+                  </p:par>
+                </p:childTnLst>
+              </p:cTn>
+              <p:prevCondLst>
+                <p:cond evt="onPrev" delay="0">
+                  <p:tgtEl>
+                    <p:sldTgt/>
+                  </p:tgtEl>
+                </p:cond>
+              </p:prevCondLst>
+              <p:nextCondLst>
+                <p:cond evt="onNext" delay="0">
+                  <p:tgtEl>
+                    <p:sldTgt/>
+                  </p:tgtEl>
+                </p:cond>
+              </p:nextCondLst>
+            </p:seq>
+          </p:childTnLst>
+        </p:cTn>
+      </p:par>
+    </p:tnLst>
+    <p:bldLst>
+      <p:bldP spid="8" grpId="0"/>
+      <p:bldP spid="11" grpId="0"/>
+    </p:bldLst>
+  </p:timing>
 </p:sld>
 </file>
 
-<file path=ppt/slides/slide2.xml><?xml version="1.0" encoding="utf-8"?>
+<file path=ppt/slides/slide10.xml><?xml version="1.0" encoding="utf-8"?>
 <p:sld xmlns:a="http://schemas.openxmlformats.org/drawingml/2006/main" xmlns:r="http://schemas.openxmlformats.org/officeDocument/2006/relationships" xmlns:p="http://schemas.openxmlformats.org/presentationml/2006/main">
   <p:cSld>
     <p:spTree>
@@ -3595,7 +4366,7 @@
           <p:cNvPr id="2" name="Titel 1">
             <a:extLst>
               <a:ext uri="{FF2B5EF4-FFF2-40B4-BE49-F238E27FC236}">
-                <a16:creationId xmlns:a16="http://schemas.microsoft.com/office/drawing/2014/main" id="{EE6370EC-8AF6-0183-9A5F-4AFB60AD2F18}"/>
+                <a16:creationId xmlns:a16="http://schemas.microsoft.com/office/drawing/2014/main" id="{5D79C57D-7647-E2EA-B3EB-BEEFFDAF4A96}"/>
               </a:ext>
             </a:extLst>
           </p:cNvPr>
@@ -3612,8 +4383,48 @@
           <a:lstStyle/>
           <a:p>
             <a:r>
+              <a:rPr lang="de-DE" dirty="0" err="1"/>
+              <a:t>Complications</a:t>
+            </a:r>
+            <a:r>
               <a:rPr lang="de-DE" dirty="0"/>
-              <a:t>YAML-files</a:t>
+              <a:t> </a:t>
+            </a:r>
+            <a:r>
+              <a:rPr lang="de-DE" dirty="0" err="1"/>
+              <a:t>that</a:t>
+            </a:r>
+            <a:r>
+              <a:rPr lang="de-DE" dirty="0"/>
+              <a:t> </a:t>
+            </a:r>
+            <a:r>
+              <a:rPr lang="de-DE" dirty="0" err="1"/>
+              <a:t>occurred</a:t>
+            </a:r>
+            <a:r>
+              <a:rPr lang="de-DE" dirty="0"/>
+              <a:t> </a:t>
+            </a:r>
+            <a:r>
+              <a:rPr lang="de-DE" dirty="0" err="1"/>
+              <a:t>when</a:t>
+            </a:r>
+            <a:r>
+              <a:rPr lang="de-DE" dirty="0"/>
+              <a:t> </a:t>
+            </a:r>
+            <a:r>
+              <a:rPr lang="de-DE" dirty="0" err="1"/>
+              <a:t>implementing</a:t>
+            </a:r>
+            <a:r>
+              <a:rPr lang="de-DE" dirty="0"/>
+              <a:t> </a:t>
+            </a:r>
+            <a:r>
+              <a:rPr lang="de-DE" dirty="0" err="1"/>
+              <a:t>this</a:t>
             </a:r>
             <a:endParaRPr lang="en-GB" dirty="0"/>
           </a:p>
@@ -3624,7 +4435,7 @@
           <p:cNvPr id="3" name="Inhaltsplatzhalter 2">
             <a:extLst>
               <a:ext uri="{FF2B5EF4-FFF2-40B4-BE49-F238E27FC236}">
-                <a16:creationId xmlns:a16="http://schemas.microsoft.com/office/drawing/2014/main" id="{298ECA33-67E8-4928-CC34-40BA21B81888}"/>
+                <a16:creationId xmlns:a16="http://schemas.microsoft.com/office/drawing/2014/main" id="{48E692C7-F393-2D3A-9A20-6865065D1954}"/>
               </a:ext>
             </a:extLst>
           </p:cNvPr>
@@ -3640,14 +4451,14 @@
           <a:bodyPr/>
           <a:lstStyle/>
           <a:p>
-            <a:endParaRPr lang="en-GB"/>
+            <a:endParaRPr lang="en-GB" dirty="0"/>
           </a:p>
         </p:txBody>
       </p:sp>
     </p:spTree>
     <p:extLst>
       <p:ext uri="{BB962C8B-B14F-4D97-AF65-F5344CB8AC3E}">
-        <p14:creationId xmlns:p14="http://schemas.microsoft.com/office/powerpoint/2010/main" val="1556435296"/>
+        <p14:creationId xmlns:p14="http://schemas.microsoft.com/office/powerpoint/2010/main" val="2883837178"/>
       </p:ext>
     </p:extLst>
   </p:cSld>
@@ -3657,12 +4468,18 @@
 </p:sld>
 </file>
 
-<file path=ppt/slides/slide3.xml><?xml version="1.0" encoding="utf-8"?>
+<file path=ppt/slides/slide11.xml><?xml version="1.0" encoding="utf-8"?>
 <p:sld xmlns:a="http://schemas.openxmlformats.org/drawingml/2006/main" xmlns:r="http://schemas.openxmlformats.org/officeDocument/2006/relationships" xmlns:p="http://schemas.openxmlformats.org/presentationml/2006/main">
   <p:cSld>
     <p:spTree>
       <p:nvGrpSpPr>
-        <p:cNvPr id="1" name=""/>
+        <p:cNvPr id="1" name="">
+          <a:extLst>
+            <a:ext uri="{FF2B5EF4-FFF2-40B4-BE49-F238E27FC236}">
+              <a16:creationId xmlns:a16="http://schemas.microsoft.com/office/drawing/2014/main" id="{4AA6025F-DA04-96C7-2FB4-2C84AF08726F}"/>
+            </a:ext>
+          </a:extLst>
+        </p:cNvPr>
         <p:cNvGrpSpPr/>
         <p:nvPr/>
       </p:nvGrpSpPr>
@@ -3679,7 +4496,7 @@
           <p:cNvPr id="2" name="Titel 1">
             <a:extLst>
               <a:ext uri="{FF2B5EF4-FFF2-40B4-BE49-F238E27FC236}">
-                <a16:creationId xmlns:a16="http://schemas.microsoft.com/office/drawing/2014/main" id="{04002DA6-529C-560C-68FE-5D1848F88838}"/>
+                <a16:creationId xmlns:a16="http://schemas.microsoft.com/office/drawing/2014/main" id="{04B275EE-D4B9-F97D-5A00-02A6D14D608B}"/>
               </a:ext>
             </a:extLst>
           </p:cNvPr>
@@ -3696,8 +4513,20 @@
           <a:lstStyle/>
           <a:p>
             <a:r>
+              <a:rPr lang="de-DE" dirty="0"/>
+              <a:t>Think </a:t>
+            </a:r>
+            <a:r>
               <a:rPr lang="de-DE" dirty="0" err="1"/>
-              <a:t>Usage</a:t>
+              <a:t>globally</a:t>
+            </a:r>
+            <a:r>
+              <a:rPr lang="de-DE" dirty="0"/>
+              <a:t>, </a:t>
+            </a:r>
+            <a:r>
+              <a:rPr lang="de-DE" sz="5400" b="1" i="1" dirty="0" err="1"/>
+              <a:t>act</a:t>
             </a:r>
             <a:r>
               <a:rPr lang="de-DE" dirty="0"/>
@@ -3705,11 +4534,11 @@
             </a:r>
             <a:r>
               <a:rPr lang="de-DE" dirty="0" err="1"/>
-              <a:t>of</a:t>
+              <a:t>locally</a:t>
             </a:r>
             <a:r>
               <a:rPr lang="de-DE" dirty="0"/>
-              <a:t> requirements.txt</a:t>
+              <a:t>!</a:t>
             </a:r>
             <a:endParaRPr lang="en-GB" dirty="0"/>
           </a:p>
@@ -3720,7 +4549,7 @@
           <p:cNvPr id="3" name="Inhaltsplatzhalter 2">
             <a:extLst>
               <a:ext uri="{FF2B5EF4-FFF2-40B4-BE49-F238E27FC236}">
-                <a16:creationId xmlns:a16="http://schemas.microsoft.com/office/drawing/2014/main" id="{267DA300-AA58-841D-8EAF-1DA75F68400B}"/>
+                <a16:creationId xmlns:a16="http://schemas.microsoft.com/office/drawing/2014/main" id="{D8EC67A4-4F7C-7CF6-4F01-EE70A6C80AC9}"/>
               </a:ext>
             </a:extLst>
           </p:cNvPr>
@@ -3731,34 +4560,508 @@
             <p:ph idx="1"/>
           </p:nvPr>
         </p:nvSpPr>
-        <p:spPr/>
+        <p:spPr>
+          <a:xfrm>
+            <a:off x="916858" y="1825624"/>
+            <a:ext cx="10515600" cy="4351338"/>
+          </a:xfrm>
+        </p:spPr>
         <p:txBody>
           <a:bodyPr/>
           <a:lstStyle/>
           <a:p>
-            <a:endParaRPr lang="en-GB"/>
-          </a:p>
-        </p:txBody>
-      </p:sp>
+            <a:pPr marL="514350" indent="-514350">
+              <a:buFont typeface="+mj-lt"/>
+              <a:buAutoNum type="arabicPeriod"/>
+            </a:pPr>
+            <a:r>
+              <a:rPr lang="en-GB" dirty="0"/>
+              <a:t>Install docker</a:t>
+            </a:r>
+          </a:p>
+          <a:p>
+            <a:pPr marL="514350" indent="-514350">
+              <a:buFont typeface="+mj-lt"/>
+              <a:buAutoNum type="arabicPeriod"/>
+            </a:pPr>
+            <a:r>
+              <a:rPr lang="en-GB" dirty="0"/>
+              <a:t>Run:  </a:t>
+            </a:r>
+            <a:r>
+              <a:rPr lang="en-GB" i="1" dirty="0" err="1"/>
+              <a:t>winget</a:t>
+            </a:r>
+            <a:r>
+              <a:rPr lang="en-GB" i="1" dirty="0"/>
+              <a:t> install </a:t>
+            </a:r>
+            <a:r>
+              <a:rPr lang="en-GB" i="1" dirty="0" err="1"/>
+              <a:t>nektos.act</a:t>
+            </a:r>
+            <a:endParaRPr lang="en-GB" i="1" dirty="0"/>
+          </a:p>
+          <a:p>
+            <a:pPr marL="514350" indent="-514350">
+              <a:buFont typeface="+mj-lt"/>
+              <a:buAutoNum type="arabicPeriod"/>
+            </a:pPr>
+            <a:r>
+              <a:rPr lang="en-GB" dirty="0"/>
+              <a:t>That’s it! </a:t>
+            </a:r>
+            <a:r>
+              <a:rPr lang="en-GB" dirty="0">
+                <a:sym typeface="Wingdings" panose="05000000000000000000" pitchFamily="2" charset="2"/>
+              </a:rPr>
+              <a:t> Run: </a:t>
+            </a:r>
+            <a:r>
+              <a:rPr lang="en-GB" i="1" dirty="0">
+                <a:sym typeface="Wingdings" panose="05000000000000000000" pitchFamily="2" charset="2"/>
+              </a:rPr>
+              <a:t>act push</a:t>
+            </a:r>
+          </a:p>
+          <a:p>
+            <a:pPr marL="514350" indent="-514350">
+              <a:buFont typeface="+mj-lt"/>
+              <a:buAutoNum type="arabicPeriod"/>
+            </a:pPr>
+            <a:endParaRPr lang="en-GB" i="1" dirty="0">
+              <a:sym typeface="Wingdings" panose="05000000000000000000" pitchFamily="2" charset="2"/>
+            </a:endParaRPr>
+          </a:p>
+          <a:p>
+            <a:pPr marL="0" indent="0">
+              <a:buNone/>
+            </a:pPr>
+            <a:r>
+              <a:rPr lang="en-GB" dirty="0">
+                <a:sym typeface="Wingdings" panose="05000000000000000000" pitchFamily="2" charset="2"/>
+              </a:rPr>
+              <a:t>Disadvantages: </a:t>
+            </a:r>
+          </a:p>
+          <a:p>
+            <a:r>
+              <a:rPr lang="en-GB" dirty="0">
+                <a:sym typeface="Wingdings" panose="05000000000000000000" pitchFamily="2" charset="2"/>
+              </a:rPr>
+              <a:t>It is not </a:t>
+            </a:r>
+            <a:r>
+              <a:rPr lang="en-GB" dirty="0" err="1">
+                <a:sym typeface="Wingdings" panose="05000000000000000000" pitchFamily="2" charset="2"/>
+              </a:rPr>
+              <a:t>Github</a:t>
+            </a:r>
+            <a:r>
+              <a:rPr lang="en-GB" dirty="0">
+                <a:sym typeface="Wingdings" panose="05000000000000000000" pitchFamily="2" charset="2"/>
+              </a:rPr>
+              <a:t> Actions </a:t>
+            </a:r>
+          </a:p>
+          <a:p>
+            <a:r>
+              <a:rPr lang="en-GB" dirty="0">
+                <a:sym typeface="Wingdings" panose="05000000000000000000" pitchFamily="2" charset="2"/>
+              </a:rPr>
+              <a:t>Limited runners: Ubuntu, self-host</a:t>
+            </a:r>
+            <a:endParaRPr lang="en-GB" dirty="0"/>
+          </a:p>
+        </p:txBody>
+      </p:sp>
+      <p:pic>
+        <p:nvPicPr>
+          <p:cNvPr id="2050" name="Picture 2" descr="Docker | How to manage Linux containers with Docker on Ubunt… | Flickr">
+            <a:extLst>
+              <a:ext uri="{FF2B5EF4-FFF2-40B4-BE49-F238E27FC236}">
+                <a16:creationId xmlns:a16="http://schemas.microsoft.com/office/drawing/2014/main" id="{FDA5252E-75FB-49DB-EBD6-F3D0B23E3B02}"/>
+              </a:ext>
+            </a:extLst>
+          </p:cNvPr>
+          <p:cNvPicPr>
+            <a:picLocks noChangeAspect="1" noChangeArrowheads="1"/>
+          </p:cNvPicPr>
+          <p:nvPr/>
+        </p:nvPicPr>
+        <p:blipFill>
+          <a:blip r:embed="rId2">
+            <a:extLst>
+              <a:ext uri="{28A0092B-C50C-407E-A947-70E740481C1C}">
+                <a14:useLocalDpi xmlns:a14="http://schemas.microsoft.com/office/drawing/2010/main" val="0"/>
+              </a:ext>
+            </a:extLst>
+          </a:blip>
+          <a:srcRect/>
+          <a:stretch>
+            <a:fillRect/>
+          </a:stretch>
+        </p:blipFill>
+        <p:spPr bwMode="auto">
+          <a:xfrm>
+            <a:off x="7622458" y="928380"/>
+            <a:ext cx="3810000" cy="3152775"/>
+          </a:xfrm>
+          <a:prstGeom prst="rect">
+            <a:avLst/>
+          </a:prstGeom>
+          <a:noFill/>
+          <a:extLst>
+            <a:ext uri="{909E8E84-426E-40DD-AFC4-6F175D3DCCD1}">
+              <a14:hiddenFill xmlns:a14="http://schemas.microsoft.com/office/drawing/2010/main">
+                <a:solidFill>
+                  <a:srgbClr val="FFFFFF"/>
+                </a:solidFill>
+              </a14:hiddenFill>
+            </a:ext>
+          </a:extLst>
+        </p:spPr>
+      </p:pic>
     </p:spTree>
     <p:extLst>
       <p:ext uri="{BB962C8B-B14F-4D97-AF65-F5344CB8AC3E}">
-        <p14:creationId xmlns:p14="http://schemas.microsoft.com/office/powerpoint/2010/main" val="840400635"/>
+        <p14:creationId xmlns:p14="http://schemas.microsoft.com/office/powerpoint/2010/main" val="1857604183"/>
       </p:ext>
     </p:extLst>
   </p:cSld>
   <p:clrMapOvr>
     <a:masterClrMapping/>
   </p:clrMapOvr>
+  <p:timing>
+    <p:tnLst>
+      <p:par>
+        <p:cTn id="1" dur="indefinite" restart="never" nodeType="tmRoot">
+          <p:childTnLst>
+            <p:seq concurrent="1" nextAc="seek">
+              <p:cTn id="2" dur="indefinite" nodeType="mainSeq">
+                <p:childTnLst>
+                  <p:par>
+                    <p:cTn id="3" fill="hold">
+                      <p:stCondLst>
+                        <p:cond delay="indefinite"/>
+                      </p:stCondLst>
+                      <p:childTnLst>
+                        <p:par>
+                          <p:cTn id="4" fill="hold">
+                            <p:stCondLst>
+                              <p:cond delay="0"/>
+                            </p:stCondLst>
+                            <p:childTnLst>
+                              <p:par>
+                                <p:cTn id="5" presetID="1" presetClass="entr" presetSubtype="0" fill="hold" nodeType="clickEffect">
+                                  <p:stCondLst>
+                                    <p:cond delay="0"/>
+                                  </p:stCondLst>
+                                  <p:childTnLst>
+                                    <p:set>
+                                      <p:cBhvr>
+                                        <p:cTn id="6" dur="1" fill="hold">
+                                          <p:stCondLst>
+                                            <p:cond delay="0"/>
+                                          </p:stCondLst>
+                                        </p:cTn>
+                                        <p:tgtEl>
+                                          <p:spTgt spid="3">
+                                            <p:txEl>
+                                              <p:pRg st="0" end="0"/>
+                                            </p:txEl>
+                                          </p:spTgt>
+                                        </p:tgtEl>
+                                        <p:attrNameLst>
+                                          <p:attrName>style.visibility</p:attrName>
+                                        </p:attrNameLst>
+                                      </p:cBhvr>
+                                      <p:to>
+                                        <p:strVal val="visible"/>
+                                      </p:to>
+                                    </p:set>
+                                  </p:childTnLst>
+                                </p:cTn>
+                              </p:par>
+                              <p:par>
+                                <p:cTn id="7" presetID="1" presetClass="entr" presetSubtype="0" fill="hold" nodeType="withEffect">
+                                  <p:stCondLst>
+                                    <p:cond delay="0"/>
+                                  </p:stCondLst>
+                                  <p:childTnLst>
+                                    <p:set>
+                                      <p:cBhvr>
+                                        <p:cTn id="8" dur="1" fill="hold">
+                                          <p:stCondLst>
+                                            <p:cond delay="0"/>
+                                          </p:stCondLst>
+                                        </p:cTn>
+                                        <p:tgtEl>
+                                          <p:spTgt spid="2050"/>
+                                        </p:tgtEl>
+                                        <p:attrNameLst>
+                                          <p:attrName>style.visibility</p:attrName>
+                                        </p:attrNameLst>
+                                      </p:cBhvr>
+                                      <p:to>
+                                        <p:strVal val="visible"/>
+                                      </p:to>
+                                    </p:set>
+                                  </p:childTnLst>
+                                </p:cTn>
+                              </p:par>
+                            </p:childTnLst>
+                          </p:cTn>
+                        </p:par>
+                      </p:childTnLst>
+                    </p:cTn>
+                  </p:par>
+                  <p:par>
+                    <p:cTn id="9" fill="hold">
+                      <p:stCondLst>
+                        <p:cond delay="indefinite"/>
+                      </p:stCondLst>
+                      <p:childTnLst>
+                        <p:par>
+                          <p:cTn id="10" fill="hold">
+                            <p:stCondLst>
+                              <p:cond delay="0"/>
+                            </p:stCondLst>
+                            <p:childTnLst>
+                              <p:par>
+                                <p:cTn id="11" presetID="1" presetClass="entr" presetSubtype="0" fill="hold" nodeType="clickEffect">
+                                  <p:stCondLst>
+                                    <p:cond delay="0"/>
+                                  </p:stCondLst>
+                                  <p:childTnLst>
+                                    <p:set>
+                                      <p:cBhvr>
+                                        <p:cTn id="12" dur="1" fill="hold">
+                                          <p:stCondLst>
+                                            <p:cond delay="0"/>
+                                          </p:stCondLst>
+                                        </p:cTn>
+                                        <p:tgtEl>
+                                          <p:spTgt spid="3">
+                                            <p:txEl>
+                                              <p:pRg st="1" end="1"/>
+                                            </p:txEl>
+                                          </p:spTgt>
+                                        </p:tgtEl>
+                                        <p:attrNameLst>
+                                          <p:attrName>style.visibility</p:attrName>
+                                        </p:attrNameLst>
+                                      </p:cBhvr>
+                                      <p:to>
+                                        <p:strVal val="visible"/>
+                                      </p:to>
+                                    </p:set>
+                                  </p:childTnLst>
+                                </p:cTn>
+                              </p:par>
+                            </p:childTnLst>
+                          </p:cTn>
+                        </p:par>
+                      </p:childTnLst>
+                    </p:cTn>
+                  </p:par>
+                  <p:par>
+                    <p:cTn id="13" fill="hold">
+                      <p:stCondLst>
+                        <p:cond delay="indefinite"/>
+                      </p:stCondLst>
+                      <p:childTnLst>
+                        <p:par>
+                          <p:cTn id="14" fill="hold">
+                            <p:stCondLst>
+                              <p:cond delay="0"/>
+                            </p:stCondLst>
+                            <p:childTnLst>
+                              <p:par>
+                                <p:cTn id="15" presetID="1" presetClass="entr" presetSubtype="0" fill="hold" nodeType="clickEffect">
+                                  <p:stCondLst>
+                                    <p:cond delay="0"/>
+                                  </p:stCondLst>
+                                  <p:childTnLst>
+                                    <p:set>
+                                      <p:cBhvr>
+                                        <p:cTn id="16" dur="1" fill="hold">
+                                          <p:stCondLst>
+                                            <p:cond delay="0"/>
+                                          </p:stCondLst>
+                                        </p:cTn>
+                                        <p:tgtEl>
+                                          <p:spTgt spid="3">
+                                            <p:txEl>
+                                              <p:pRg st="2" end="2"/>
+                                            </p:txEl>
+                                          </p:spTgt>
+                                        </p:tgtEl>
+                                        <p:attrNameLst>
+                                          <p:attrName>style.visibility</p:attrName>
+                                        </p:attrNameLst>
+                                      </p:cBhvr>
+                                      <p:to>
+                                        <p:strVal val="visible"/>
+                                      </p:to>
+                                    </p:set>
+                                  </p:childTnLst>
+                                </p:cTn>
+                              </p:par>
+                            </p:childTnLst>
+                          </p:cTn>
+                        </p:par>
+                      </p:childTnLst>
+                    </p:cTn>
+                  </p:par>
+                  <p:par>
+                    <p:cTn id="17" fill="hold">
+                      <p:stCondLst>
+                        <p:cond delay="indefinite"/>
+                      </p:stCondLst>
+                      <p:childTnLst>
+                        <p:par>
+                          <p:cTn id="18" fill="hold">
+                            <p:stCondLst>
+                              <p:cond delay="0"/>
+                            </p:stCondLst>
+                            <p:childTnLst>
+                              <p:par>
+                                <p:cTn id="19" presetID="1" presetClass="entr" presetSubtype="0" fill="hold" nodeType="clickEffect">
+                                  <p:stCondLst>
+                                    <p:cond delay="0"/>
+                                  </p:stCondLst>
+                                  <p:childTnLst>
+                                    <p:set>
+                                      <p:cBhvr>
+                                        <p:cTn id="20" dur="1" fill="hold">
+                                          <p:stCondLst>
+                                            <p:cond delay="0"/>
+                                          </p:stCondLst>
+                                        </p:cTn>
+                                        <p:tgtEl>
+                                          <p:spTgt spid="3">
+                                            <p:txEl>
+                                              <p:pRg st="4" end="4"/>
+                                            </p:txEl>
+                                          </p:spTgt>
+                                        </p:tgtEl>
+                                        <p:attrNameLst>
+                                          <p:attrName>style.visibility</p:attrName>
+                                        </p:attrNameLst>
+                                      </p:cBhvr>
+                                      <p:to>
+                                        <p:strVal val="visible"/>
+                                      </p:to>
+                                    </p:set>
+                                  </p:childTnLst>
+                                </p:cTn>
+                              </p:par>
+                              <p:par>
+                                <p:cTn id="21" presetID="1" presetClass="entr" presetSubtype="0" fill="hold" nodeType="withEffect">
+                                  <p:stCondLst>
+                                    <p:cond delay="0"/>
+                                  </p:stCondLst>
+                                  <p:childTnLst>
+                                    <p:set>
+                                      <p:cBhvr>
+                                        <p:cTn id="22" dur="1" fill="hold">
+                                          <p:stCondLst>
+                                            <p:cond delay="0"/>
+                                          </p:stCondLst>
+                                        </p:cTn>
+                                        <p:tgtEl>
+                                          <p:spTgt spid="3">
+                                            <p:txEl>
+                                              <p:pRg st="5" end="5"/>
+                                            </p:txEl>
+                                          </p:spTgt>
+                                        </p:tgtEl>
+                                        <p:attrNameLst>
+                                          <p:attrName>style.visibility</p:attrName>
+                                        </p:attrNameLst>
+                                      </p:cBhvr>
+                                      <p:to>
+                                        <p:strVal val="visible"/>
+                                      </p:to>
+                                    </p:set>
+                                  </p:childTnLst>
+                                </p:cTn>
+                              </p:par>
+                              <p:par>
+                                <p:cTn id="23" presetID="1" presetClass="entr" presetSubtype="0" fill="hold" nodeType="withEffect">
+                                  <p:stCondLst>
+                                    <p:cond delay="0"/>
+                                  </p:stCondLst>
+                                  <p:childTnLst>
+                                    <p:set>
+                                      <p:cBhvr>
+                                        <p:cTn id="24" dur="1" fill="hold">
+                                          <p:stCondLst>
+                                            <p:cond delay="0"/>
+                                          </p:stCondLst>
+                                        </p:cTn>
+                                        <p:tgtEl>
+                                          <p:spTgt spid="3">
+                                            <p:txEl>
+                                              <p:pRg st="6" end="6"/>
+                                            </p:txEl>
+                                          </p:spTgt>
+                                        </p:tgtEl>
+                                        <p:attrNameLst>
+                                          <p:attrName>style.visibility</p:attrName>
+                                        </p:attrNameLst>
+                                      </p:cBhvr>
+                                      <p:to>
+                                        <p:strVal val="visible"/>
+                                      </p:to>
+                                    </p:set>
+                                  </p:childTnLst>
+                                </p:cTn>
+                              </p:par>
+                            </p:childTnLst>
+                          </p:cTn>
+                        </p:par>
+                      </p:childTnLst>
+                    </p:cTn>
+                  </p:par>
+                </p:childTnLst>
+              </p:cTn>
+              <p:prevCondLst>
+                <p:cond evt="onPrev" delay="0">
+                  <p:tgtEl>
+                    <p:sldTgt/>
+                  </p:tgtEl>
+                </p:cond>
+              </p:prevCondLst>
+              <p:nextCondLst>
+                <p:cond evt="onNext" delay="0">
+                  <p:tgtEl>
+                    <p:sldTgt/>
+                  </p:tgtEl>
+                </p:cond>
+              </p:nextCondLst>
+            </p:seq>
+          </p:childTnLst>
+        </p:cTn>
+      </p:par>
+    </p:tnLst>
+  </p:timing>
 </p:sld>
 </file>
 
-<file path=ppt/slides/slide4.xml><?xml version="1.0" encoding="utf-8"?>
+<file path=ppt/slides/slide2.xml><?xml version="1.0" encoding="utf-8"?>
 <p:sld xmlns:a="http://schemas.openxmlformats.org/drawingml/2006/main" xmlns:r="http://schemas.openxmlformats.org/officeDocument/2006/relationships" xmlns:p="http://schemas.openxmlformats.org/presentationml/2006/main">
   <p:cSld>
     <p:spTree>
       <p:nvGrpSpPr>
-        <p:cNvPr id="1" name=""/>
+        <p:cNvPr id="1" name="">
+          <a:extLst>
+            <a:ext uri="{FF2B5EF4-FFF2-40B4-BE49-F238E27FC236}">
+              <a16:creationId xmlns:a16="http://schemas.microsoft.com/office/drawing/2014/main" id="{A0FF0767-1CF7-C1E6-F24E-FFB8CAB43E0E}"/>
+            </a:ext>
+          </a:extLst>
+        </p:cNvPr>
         <p:cNvGrpSpPr/>
         <p:nvPr/>
       </p:nvGrpSpPr>
@@ -3772,10 +5075,10 @@
       </p:grpSpPr>
       <p:sp>
         <p:nvSpPr>
-          <p:cNvPr id="2" name="Titel 1">
-            <a:extLst>
-              <a:ext uri="{FF2B5EF4-FFF2-40B4-BE49-F238E27FC236}">
-                <a16:creationId xmlns:a16="http://schemas.microsoft.com/office/drawing/2014/main" id="{4137F645-5DFC-30C6-1995-EA5E243D0982}"/>
+          <p:cNvPr id="4" name="Titel 3">
+            <a:extLst>
+              <a:ext uri="{FF2B5EF4-FFF2-40B4-BE49-F238E27FC236}">
+                <a16:creationId xmlns:a16="http://schemas.microsoft.com/office/drawing/2014/main" id="{06DCA81C-D368-1F6D-E18A-8EF7532E9F6A}"/>
               </a:ext>
             </a:extLst>
           </p:cNvPr>
@@ -3793,47 +5096,1758 @@
           <a:p>
             <a:r>
               <a:rPr lang="de-DE" dirty="0" err="1"/>
-              <a:t>Artifacts</a:t>
+              <a:t>Packaging</a:t>
+            </a:r>
+            <a:r>
+              <a:rPr lang="de-DE" dirty="0"/>
+              <a:t> </a:t>
+            </a:r>
+            <a:r>
+              <a:rPr lang="de-DE" dirty="0" err="1"/>
+              <a:t>the</a:t>
+            </a:r>
+            <a:r>
+              <a:rPr lang="de-DE" dirty="0"/>
+              <a:t> </a:t>
+            </a:r>
+            <a:r>
+              <a:rPr lang="de-DE" dirty="0" err="1"/>
+              <a:t>project</a:t>
+            </a:r>
+            <a:r>
+              <a:rPr lang="de-DE" dirty="0"/>
+              <a:t>: </a:t>
+            </a:r>
+            <a:r>
+              <a:rPr lang="de-DE" dirty="0" err="1"/>
+              <a:t>Restructure</a:t>
             </a:r>
             <a:endParaRPr lang="en-GB" dirty="0"/>
           </a:p>
         </p:txBody>
       </p:sp>
-      <p:sp>
-        <p:nvSpPr>
-          <p:cNvPr id="3" name="Inhaltsplatzhalter 2">
-            <a:extLst>
-              <a:ext uri="{FF2B5EF4-FFF2-40B4-BE49-F238E27FC236}">
-                <a16:creationId xmlns:a16="http://schemas.microsoft.com/office/drawing/2014/main" id="{87A379A8-A4CA-D096-7AF6-C6ED68A528BB}"/>
-              </a:ext>
-            </a:extLst>
-          </p:cNvPr>
-          <p:cNvSpPr>
-            <a:spLocks noGrp="1"/>
-          </p:cNvSpPr>
-          <p:nvPr>
-            <p:ph idx="1"/>
-          </p:nvPr>
-        </p:nvSpPr>
-        <p:spPr/>
-        <p:txBody>
-          <a:bodyPr/>
+      <p:pic>
+        <p:nvPicPr>
+          <p:cNvPr id="13" name="Grafik 12">
+            <a:extLst>
+              <a:ext uri="{FF2B5EF4-FFF2-40B4-BE49-F238E27FC236}">
+                <a16:creationId xmlns:a16="http://schemas.microsoft.com/office/drawing/2014/main" id="{64E07460-2879-B93F-7A47-44F11AE16134}"/>
+              </a:ext>
+            </a:extLst>
+          </p:cNvPr>
+          <p:cNvPicPr>
+            <a:picLocks noChangeAspect="1"/>
+          </p:cNvPicPr>
+          <p:nvPr/>
+        </p:nvPicPr>
+        <p:blipFill>
+          <a:blip r:embed="rId2"/>
+          <a:stretch>
+            <a:fillRect/>
+          </a:stretch>
+        </p:blipFill>
+        <p:spPr>
+          <a:xfrm>
+            <a:off x="2417813" y="1573467"/>
+            <a:ext cx="7356373" cy="4638103"/>
+          </a:xfrm>
+          <a:prstGeom prst="rect">
+            <a:avLst/>
+          </a:prstGeom>
+        </p:spPr>
+      </p:pic>
+      <p:sp>
+        <p:nvSpPr>
+          <p:cNvPr id="14" name="Textfeld 13">
+            <a:extLst>
+              <a:ext uri="{FF2B5EF4-FFF2-40B4-BE49-F238E27FC236}">
+                <a16:creationId xmlns:a16="http://schemas.microsoft.com/office/drawing/2014/main" id="{C04E2020-3379-3465-594F-05E1714E967B}"/>
+              </a:ext>
+            </a:extLst>
+          </p:cNvPr>
+          <p:cNvSpPr txBox="1"/>
+          <p:nvPr/>
+        </p:nvSpPr>
+        <p:spPr>
+          <a:xfrm>
+            <a:off x="393285" y="3200019"/>
+            <a:ext cx="2024528" cy="1384995"/>
+          </a:xfrm>
+          <a:prstGeom prst="rect">
+            <a:avLst/>
+          </a:prstGeom>
+          <a:noFill/>
+        </p:spPr>
+        <p:txBody>
+          <a:bodyPr wrap="square" rtlCol="0">
+            <a:spAutoFit/>
+          </a:bodyPr>
           <a:lstStyle/>
           <a:p>
-            <a:endParaRPr lang="en-GB"/>
+            <a:r>
+              <a:rPr lang="en-US" sz="2800" dirty="0"/>
+              <a:t>Adds unwanted project files</a:t>
+            </a:r>
+          </a:p>
+        </p:txBody>
+      </p:sp>
+      <p:sp>
+        <p:nvSpPr>
+          <p:cNvPr id="16" name="Textfeld 15">
+            <a:extLst>
+              <a:ext uri="{FF2B5EF4-FFF2-40B4-BE49-F238E27FC236}">
+                <a16:creationId xmlns:a16="http://schemas.microsoft.com/office/drawing/2014/main" id="{8DE5DB4A-CFB2-59AA-9EAB-6A9CA2F63DFF}"/>
+              </a:ext>
+            </a:extLst>
+          </p:cNvPr>
+          <p:cNvSpPr txBox="1"/>
+          <p:nvPr/>
+        </p:nvSpPr>
+        <p:spPr>
+          <a:xfrm>
+            <a:off x="10078985" y="3415464"/>
+            <a:ext cx="2024525" cy="954107"/>
+          </a:xfrm>
+          <a:prstGeom prst="rect">
+            <a:avLst/>
+          </a:prstGeom>
+          <a:noFill/>
+        </p:spPr>
+        <p:txBody>
+          <a:bodyPr wrap="square" rtlCol="0">
+            <a:spAutoFit/>
+          </a:bodyPr>
+          <a:lstStyle/>
+          <a:p>
+            <a:r>
+              <a:rPr lang="de-DE" sz="2800" dirty="0" err="1"/>
+              <a:t>Requires</a:t>
+            </a:r>
+            <a:r>
+              <a:rPr lang="de-DE" sz="2800" dirty="0"/>
+              <a:t> </a:t>
+            </a:r>
+            <a:r>
+              <a:rPr lang="de-DE" sz="2800" dirty="0" err="1"/>
+              <a:t>installation</a:t>
+            </a:r>
+            <a:endParaRPr lang="de-DE" sz="2800" dirty="0"/>
+          </a:p>
+        </p:txBody>
+      </p:sp>
+      <p:sp>
+        <p:nvSpPr>
+          <p:cNvPr id="17" name="Rechteck: abgerundete Ecken 16">
+            <a:extLst>
+              <a:ext uri="{FF2B5EF4-FFF2-40B4-BE49-F238E27FC236}">
+                <a16:creationId xmlns:a16="http://schemas.microsoft.com/office/drawing/2014/main" id="{C463BFDF-4ACB-AB95-CBD9-F62740D31ED1}"/>
+              </a:ext>
+            </a:extLst>
+          </p:cNvPr>
+          <p:cNvSpPr/>
+          <p:nvPr/>
+        </p:nvSpPr>
+        <p:spPr>
+          <a:xfrm>
+            <a:off x="2417812" y="3716976"/>
+            <a:ext cx="2822781" cy="1567557"/>
+          </a:xfrm>
+          <a:prstGeom prst="roundRect">
+            <a:avLst/>
+          </a:prstGeom>
+          <a:noFill/>
+          <a:ln w="38100">
+            <a:solidFill>
+              <a:srgbClr val="FF0000"/>
+            </a:solidFill>
+          </a:ln>
+        </p:spPr>
+        <p:style>
+          <a:lnRef idx="2">
+            <a:schemeClr val="accent1">
+              <a:shade val="15000"/>
+            </a:schemeClr>
+          </a:lnRef>
+          <a:fillRef idx="1">
+            <a:schemeClr val="accent1"/>
+          </a:fillRef>
+          <a:effectRef idx="0">
+            <a:schemeClr val="accent1"/>
+          </a:effectRef>
+          <a:fontRef idx="minor">
+            <a:schemeClr val="lt1"/>
+          </a:fontRef>
+        </p:style>
+        <p:txBody>
+          <a:bodyPr rtlCol="0" anchor="ctr"/>
+          <a:lstStyle/>
+          <a:p>
+            <a:pPr algn="ctr"/>
+            <a:endParaRPr lang="de-AT" dirty="0"/>
           </a:p>
         </p:txBody>
       </p:sp>
     </p:spTree>
     <p:extLst>
       <p:ext uri="{BB962C8B-B14F-4D97-AF65-F5344CB8AC3E}">
-        <p14:creationId xmlns:p14="http://schemas.microsoft.com/office/powerpoint/2010/main" val="2002680346"/>
+        <p14:creationId xmlns:p14="http://schemas.microsoft.com/office/powerpoint/2010/main" val="3754640823"/>
       </p:ext>
     </p:extLst>
   </p:cSld>
   <p:clrMapOvr>
     <a:masterClrMapping/>
   </p:clrMapOvr>
+  <p:timing>
+    <p:tnLst>
+      <p:par>
+        <p:cTn id="1" dur="indefinite" restart="never" nodeType="tmRoot">
+          <p:childTnLst>
+            <p:seq concurrent="1" nextAc="seek">
+              <p:cTn id="2" dur="indefinite" nodeType="mainSeq">
+                <p:childTnLst>
+                  <p:par>
+                    <p:cTn id="3" fill="hold">
+                      <p:stCondLst>
+                        <p:cond delay="indefinite"/>
+                      </p:stCondLst>
+                      <p:childTnLst>
+                        <p:par>
+                          <p:cTn id="4" fill="hold">
+                            <p:stCondLst>
+                              <p:cond delay="0"/>
+                            </p:stCondLst>
+                            <p:childTnLst>
+                              <p:par>
+                                <p:cTn id="5" presetID="1" presetClass="entr" presetSubtype="0" fill="hold" grpId="0" nodeType="clickEffect">
+                                  <p:stCondLst>
+                                    <p:cond delay="0"/>
+                                  </p:stCondLst>
+                                  <p:childTnLst>
+                                    <p:set>
+                                      <p:cBhvr>
+                                        <p:cTn id="6" dur="1" fill="hold">
+                                          <p:stCondLst>
+                                            <p:cond delay="0"/>
+                                          </p:stCondLst>
+                                        </p:cTn>
+                                        <p:tgtEl>
+                                          <p:spTgt spid="16"/>
+                                        </p:tgtEl>
+                                        <p:attrNameLst>
+                                          <p:attrName>style.visibility</p:attrName>
+                                        </p:attrNameLst>
+                                      </p:cBhvr>
+                                      <p:to>
+                                        <p:strVal val="visible"/>
+                                      </p:to>
+                                    </p:set>
+                                  </p:childTnLst>
+                                </p:cTn>
+                              </p:par>
+                            </p:childTnLst>
+                          </p:cTn>
+                        </p:par>
+                      </p:childTnLst>
+                    </p:cTn>
+                  </p:par>
+                  <p:par>
+                    <p:cTn id="7" fill="hold">
+                      <p:stCondLst>
+                        <p:cond delay="indefinite"/>
+                      </p:stCondLst>
+                      <p:childTnLst>
+                        <p:par>
+                          <p:cTn id="8" fill="hold">
+                            <p:stCondLst>
+                              <p:cond delay="0"/>
+                            </p:stCondLst>
+                            <p:childTnLst>
+                              <p:par>
+                                <p:cTn id="9" presetID="1" presetClass="entr" presetSubtype="0" fill="hold" grpId="0" nodeType="clickEffect">
+                                  <p:stCondLst>
+                                    <p:cond delay="0"/>
+                                  </p:stCondLst>
+                                  <p:childTnLst>
+                                    <p:set>
+                                      <p:cBhvr>
+                                        <p:cTn id="10" dur="1" fill="hold">
+                                          <p:stCondLst>
+                                            <p:cond delay="0"/>
+                                          </p:stCondLst>
+                                        </p:cTn>
+                                        <p:tgtEl>
+                                          <p:spTgt spid="14"/>
+                                        </p:tgtEl>
+                                        <p:attrNameLst>
+                                          <p:attrName>style.visibility</p:attrName>
+                                        </p:attrNameLst>
+                                      </p:cBhvr>
+                                      <p:to>
+                                        <p:strVal val="visible"/>
+                                      </p:to>
+                                    </p:set>
+                                  </p:childTnLst>
+                                </p:cTn>
+                              </p:par>
+                              <p:par>
+                                <p:cTn id="11" presetID="1" presetClass="entr" presetSubtype="0" fill="hold" grpId="0" nodeType="withEffect">
+                                  <p:stCondLst>
+                                    <p:cond delay="0"/>
+                                  </p:stCondLst>
+                                  <p:childTnLst>
+                                    <p:set>
+                                      <p:cBhvr>
+                                        <p:cTn id="12" dur="1" fill="hold">
+                                          <p:stCondLst>
+                                            <p:cond delay="0"/>
+                                          </p:stCondLst>
+                                        </p:cTn>
+                                        <p:tgtEl>
+                                          <p:spTgt spid="17"/>
+                                        </p:tgtEl>
+                                        <p:attrNameLst>
+                                          <p:attrName>style.visibility</p:attrName>
+                                        </p:attrNameLst>
+                                      </p:cBhvr>
+                                      <p:to>
+                                        <p:strVal val="visible"/>
+                                      </p:to>
+                                    </p:set>
+                                  </p:childTnLst>
+                                </p:cTn>
+                              </p:par>
+                            </p:childTnLst>
+                          </p:cTn>
+                        </p:par>
+                      </p:childTnLst>
+                    </p:cTn>
+                  </p:par>
+                </p:childTnLst>
+              </p:cTn>
+              <p:prevCondLst>
+                <p:cond evt="onPrev" delay="0">
+                  <p:tgtEl>
+                    <p:sldTgt/>
+                  </p:tgtEl>
+                </p:cond>
+              </p:prevCondLst>
+              <p:nextCondLst>
+                <p:cond evt="onNext" delay="0">
+                  <p:tgtEl>
+                    <p:sldTgt/>
+                  </p:tgtEl>
+                </p:cond>
+              </p:nextCondLst>
+            </p:seq>
+          </p:childTnLst>
+        </p:cTn>
+      </p:par>
+    </p:tnLst>
+    <p:bldLst>
+      <p:bldP spid="14" grpId="0"/>
+      <p:bldP spid="16" grpId="0"/>
+      <p:bldP spid="17" grpId="0" animBg="1"/>
+    </p:bldLst>
+  </p:timing>
+</p:sld>
+</file>
+
+<file path=ppt/slides/slide3.xml><?xml version="1.0" encoding="utf-8"?>
+<p:sld xmlns:a="http://schemas.openxmlformats.org/drawingml/2006/main" xmlns:r="http://schemas.openxmlformats.org/officeDocument/2006/relationships" xmlns:p="http://schemas.openxmlformats.org/presentationml/2006/main">
+  <p:cSld>
+    <p:spTree>
+      <p:nvGrpSpPr>
+        <p:cNvPr id="1" name="">
+          <a:extLst>
+            <a:ext uri="{FF2B5EF4-FFF2-40B4-BE49-F238E27FC236}">
+              <a16:creationId xmlns:a16="http://schemas.microsoft.com/office/drawing/2014/main" id="{BBFFEB03-44DC-90A2-5637-D0B804FB680C}"/>
+            </a:ext>
+          </a:extLst>
+        </p:cNvPr>
+        <p:cNvGrpSpPr/>
+        <p:nvPr/>
+      </p:nvGrpSpPr>
+      <p:grpSpPr>
+        <a:xfrm>
+          <a:off x="0" y="0"/>
+          <a:ext cx="0" cy="0"/>
+          <a:chOff x="0" y="0"/>
+          <a:chExt cx="0" cy="0"/>
+        </a:xfrm>
+      </p:grpSpPr>
+      <p:pic>
+        <p:nvPicPr>
+          <p:cNvPr id="6" name="Grafik 5">
+            <a:extLst>
+              <a:ext uri="{FF2B5EF4-FFF2-40B4-BE49-F238E27FC236}">
+                <a16:creationId xmlns:a16="http://schemas.microsoft.com/office/drawing/2014/main" id="{3DE9E814-F5E6-7A6E-B1AE-45DF527F04C1}"/>
+              </a:ext>
+            </a:extLst>
+          </p:cNvPr>
+          <p:cNvPicPr>
+            <a:picLocks noChangeAspect="1"/>
+          </p:cNvPicPr>
+          <p:nvPr/>
+        </p:nvPicPr>
+        <p:blipFill>
+          <a:blip r:embed="rId2">
+            <a:extLst>
+              <a:ext uri="{28A0092B-C50C-407E-A947-70E740481C1C}">
+                <a14:useLocalDpi xmlns:a14="http://schemas.microsoft.com/office/drawing/2010/main" val="0"/>
+              </a:ext>
+            </a:extLst>
+          </a:blip>
+          <a:srcRect/>
+          <a:stretch/>
+        </p:blipFill>
+        <p:spPr>
+          <a:xfrm>
+            <a:off x="772747" y="64459"/>
+            <a:ext cx="4001518" cy="6729082"/>
+          </a:xfrm>
+          <a:prstGeom prst="rect">
+            <a:avLst/>
+          </a:prstGeom>
+        </p:spPr>
+      </p:pic>
+      <p:pic>
+        <p:nvPicPr>
+          <p:cNvPr id="8" name="Grafik 7">
+            <a:extLst>
+              <a:ext uri="{FF2B5EF4-FFF2-40B4-BE49-F238E27FC236}">
+                <a16:creationId xmlns:a16="http://schemas.microsoft.com/office/drawing/2014/main" id="{BFD9CB98-ECB3-4006-C560-785E1E27E47F}"/>
+              </a:ext>
+            </a:extLst>
+          </p:cNvPr>
+          <p:cNvPicPr>
+            <a:picLocks noChangeAspect="1"/>
+          </p:cNvPicPr>
+          <p:nvPr/>
+        </p:nvPicPr>
+        <p:blipFill>
+          <a:blip r:embed="rId3"/>
+          <a:stretch>
+            <a:fillRect/>
+          </a:stretch>
+        </p:blipFill>
+        <p:spPr>
+          <a:xfrm>
+            <a:off x="6689748" y="64459"/>
+            <a:ext cx="4817916" cy="6729082"/>
+          </a:xfrm>
+          <a:prstGeom prst="rect">
+            <a:avLst/>
+          </a:prstGeom>
+        </p:spPr>
+      </p:pic>
+      <p:sp>
+        <p:nvSpPr>
+          <p:cNvPr id="9" name="Rechteck: abgerundete Ecken 8">
+            <a:extLst>
+              <a:ext uri="{FF2B5EF4-FFF2-40B4-BE49-F238E27FC236}">
+                <a16:creationId xmlns:a16="http://schemas.microsoft.com/office/drawing/2014/main" id="{78B8D1F9-DCA5-0C2E-893A-66E68BF1A029}"/>
+              </a:ext>
+            </a:extLst>
+          </p:cNvPr>
+          <p:cNvSpPr/>
+          <p:nvPr/>
+        </p:nvSpPr>
+        <p:spPr>
+          <a:xfrm>
+            <a:off x="7669161" y="3409336"/>
+            <a:ext cx="1494503" cy="331839"/>
+          </a:xfrm>
+          <a:prstGeom prst="roundRect">
+            <a:avLst/>
+          </a:prstGeom>
+          <a:noFill/>
+          <a:ln w="28575">
+            <a:solidFill>
+              <a:srgbClr val="FF0000"/>
+            </a:solidFill>
+          </a:ln>
+        </p:spPr>
+        <p:style>
+          <a:lnRef idx="2">
+            <a:schemeClr val="accent1">
+              <a:shade val="15000"/>
+            </a:schemeClr>
+          </a:lnRef>
+          <a:fillRef idx="1">
+            <a:schemeClr val="accent1"/>
+          </a:fillRef>
+          <a:effectRef idx="0">
+            <a:schemeClr val="accent1"/>
+          </a:effectRef>
+          <a:fontRef idx="minor">
+            <a:schemeClr val="lt1"/>
+          </a:fontRef>
+        </p:style>
+        <p:txBody>
+          <a:bodyPr rtlCol="0" anchor="ctr"/>
+          <a:lstStyle/>
+          <a:p>
+            <a:pPr algn="ctr"/>
+            <a:endParaRPr lang="de-AT" dirty="0"/>
+          </a:p>
+        </p:txBody>
+      </p:sp>
+      <p:sp>
+        <p:nvSpPr>
+          <p:cNvPr id="10" name="Rechteck: abgerundete Ecken 9">
+            <a:extLst>
+              <a:ext uri="{FF2B5EF4-FFF2-40B4-BE49-F238E27FC236}">
+                <a16:creationId xmlns:a16="http://schemas.microsoft.com/office/drawing/2014/main" id="{E982D9FD-55A0-5626-9351-9EA3238489C6}"/>
+              </a:ext>
+            </a:extLst>
+          </p:cNvPr>
+          <p:cNvSpPr/>
+          <p:nvPr/>
+        </p:nvSpPr>
+        <p:spPr>
+          <a:xfrm>
+            <a:off x="9591368" y="966020"/>
+            <a:ext cx="1494503" cy="331839"/>
+          </a:xfrm>
+          <a:prstGeom prst="roundRect">
+            <a:avLst/>
+          </a:prstGeom>
+          <a:noFill/>
+          <a:ln w="28575">
+            <a:solidFill>
+              <a:srgbClr val="FF0000"/>
+            </a:solidFill>
+          </a:ln>
+        </p:spPr>
+        <p:style>
+          <a:lnRef idx="2">
+            <a:schemeClr val="accent1">
+              <a:shade val="15000"/>
+            </a:schemeClr>
+          </a:lnRef>
+          <a:fillRef idx="1">
+            <a:schemeClr val="accent1"/>
+          </a:fillRef>
+          <a:effectRef idx="0">
+            <a:schemeClr val="accent1"/>
+          </a:effectRef>
+          <a:fontRef idx="minor">
+            <a:schemeClr val="lt1"/>
+          </a:fontRef>
+        </p:style>
+        <p:txBody>
+          <a:bodyPr rtlCol="0" anchor="ctr"/>
+          <a:lstStyle/>
+          <a:p>
+            <a:pPr algn="ctr"/>
+            <a:endParaRPr lang="de-AT" dirty="0"/>
+          </a:p>
+        </p:txBody>
+      </p:sp>
+      <p:sp>
+        <p:nvSpPr>
+          <p:cNvPr id="11" name="Rechteck: abgerundete Ecken 10">
+            <a:extLst>
+              <a:ext uri="{FF2B5EF4-FFF2-40B4-BE49-F238E27FC236}">
+                <a16:creationId xmlns:a16="http://schemas.microsoft.com/office/drawing/2014/main" id="{53DB8D66-2D9D-7C1E-42D5-BAEDF77F699F}"/>
+              </a:ext>
+            </a:extLst>
+          </p:cNvPr>
+          <p:cNvSpPr/>
+          <p:nvPr/>
+        </p:nvSpPr>
+        <p:spPr>
+          <a:xfrm>
+            <a:off x="9379975" y="1268363"/>
+            <a:ext cx="1494503" cy="331839"/>
+          </a:xfrm>
+          <a:prstGeom prst="roundRect">
+            <a:avLst/>
+          </a:prstGeom>
+          <a:noFill/>
+          <a:ln w="28575">
+            <a:solidFill>
+              <a:srgbClr val="FF0000"/>
+            </a:solidFill>
+          </a:ln>
+        </p:spPr>
+        <p:style>
+          <a:lnRef idx="2">
+            <a:schemeClr val="accent1">
+              <a:shade val="15000"/>
+            </a:schemeClr>
+          </a:lnRef>
+          <a:fillRef idx="1">
+            <a:schemeClr val="accent1"/>
+          </a:fillRef>
+          <a:effectRef idx="0">
+            <a:schemeClr val="accent1"/>
+          </a:effectRef>
+          <a:fontRef idx="minor">
+            <a:schemeClr val="lt1"/>
+          </a:fontRef>
+        </p:style>
+        <p:txBody>
+          <a:bodyPr rtlCol="0" anchor="ctr"/>
+          <a:lstStyle/>
+          <a:p>
+            <a:pPr algn="ctr"/>
+            <a:endParaRPr lang="de-AT" dirty="0"/>
+          </a:p>
+        </p:txBody>
+      </p:sp>
+      <p:sp>
+        <p:nvSpPr>
+          <p:cNvPr id="12" name="Rechteck: abgerundete Ecken 11">
+            <a:extLst>
+              <a:ext uri="{FF2B5EF4-FFF2-40B4-BE49-F238E27FC236}">
+                <a16:creationId xmlns:a16="http://schemas.microsoft.com/office/drawing/2014/main" id="{B4CC7F7C-A1C5-4942-41E0-FC194CA8E77F}"/>
+              </a:ext>
+            </a:extLst>
+          </p:cNvPr>
+          <p:cNvSpPr/>
+          <p:nvPr/>
+        </p:nvSpPr>
+        <p:spPr>
+          <a:xfrm>
+            <a:off x="9207909" y="1578077"/>
+            <a:ext cx="1494503" cy="331839"/>
+          </a:xfrm>
+          <a:prstGeom prst="roundRect">
+            <a:avLst/>
+          </a:prstGeom>
+          <a:noFill/>
+          <a:ln w="28575">
+            <a:solidFill>
+              <a:srgbClr val="FF0000"/>
+            </a:solidFill>
+          </a:ln>
+        </p:spPr>
+        <p:style>
+          <a:lnRef idx="2">
+            <a:schemeClr val="accent1">
+              <a:shade val="15000"/>
+            </a:schemeClr>
+          </a:lnRef>
+          <a:fillRef idx="1">
+            <a:schemeClr val="accent1"/>
+          </a:fillRef>
+          <a:effectRef idx="0">
+            <a:schemeClr val="accent1"/>
+          </a:effectRef>
+          <a:fontRef idx="minor">
+            <a:schemeClr val="lt1"/>
+          </a:fontRef>
+        </p:style>
+        <p:txBody>
+          <a:bodyPr rtlCol="0" anchor="ctr"/>
+          <a:lstStyle/>
+          <a:p>
+            <a:pPr algn="ctr"/>
+            <a:endParaRPr lang="de-AT" dirty="0"/>
+          </a:p>
+        </p:txBody>
+      </p:sp>
+      <p:sp>
+        <p:nvSpPr>
+          <p:cNvPr id="15" name="Rechteck: abgerundete Ecken 14">
+            <a:extLst>
+              <a:ext uri="{FF2B5EF4-FFF2-40B4-BE49-F238E27FC236}">
+                <a16:creationId xmlns:a16="http://schemas.microsoft.com/office/drawing/2014/main" id="{A677088B-2496-364B-5477-0E041D76F1FB}"/>
+              </a:ext>
+            </a:extLst>
+          </p:cNvPr>
+          <p:cNvSpPr/>
+          <p:nvPr/>
+        </p:nvSpPr>
+        <p:spPr>
+          <a:xfrm>
+            <a:off x="8750710" y="3077497"/>
+            <a:ext cx="1494503" cy="331839"/>
+          </a:xfrm>
+          <a:prstGeom prst="roundRect">
+            <a:avLst/>
+          </a:prstGeom>
+          <a:noFill/>
+          <a:ln w="28575">
+            <a:solidFill>
+              <a:srgbClr val="FF0000"/>
+            </a:solidFill>
+          </a:ln>
+        </p:spPr>
+        <p:style>
+          <a:lnRef idx="2">
+            <a:schemeClr val="accent1">
+              <a:shade val="15000"/>
+            </a:schemeClr>
+          </a:lnRef>
+          <a:fillRef idx="1">
+            <a:schemeClr val="accent1"/>
+          </a:fillRef>
+          <a:effectRef idx="0">
+            <a:schemeClr val="accent1"/>
+          </a:effectRef>
+          <a:fontRef idx="minor">
+            <a:schemeClr val="lt1"/>
+          </a:fontRef>
+        </p:style>
+        <p:txBody>
+          <a:bodyPr rtlCol="0" anchor="ctr"/>
+          <a:lstStyle/>
+          <a:p>
+            <a:pPr algn="ctr"/>
+            <a:endParaRPr lang="de-AT" dirty="0"/>
+          </a:p>
+        </p:txBody>
+      </p:sp>
+      <p:sp>
+        <p:nvSpPr>
+          <p:cNvPr id="18" name="Rechteck: abgerundete Ecken 17">
+            <a:extLst>
+              <a:ext uri="{FF2B5EF4-FFF2-40B4-BE49-F238E27FC236}">
+                <a16:creationId xmlns:a16="http://schemas.microsoft.com/office/drawing/2014/main" id="{CCBF11B0-9D51-EB7F-F8F2-834C8D5F9FC3}"/>
+              </a:ext>
+            </a:extLst>
+          </p:cNvPr>
+          <p:cNvSpPr/>
+          <p:nvPr/>
+        </p:nvSpPr>
+        <p:spPr>
+          <a:xfrm>
+            <a:off x="7216879" y="6421827"/>
+            <a:ext cx="2084437" cy="331839"/>
+          </a:xfrm>
+          <a:prstGeom prst="roundRect">
+            <a:avLst/>
+          </a:prstGeom>
+          <a:noFill/>
+          <a:ln w="28575">
+            <a:solidFill>
+              <a:srgbClr val="0070C0"/>
+            </a:solidFill>
+          </a:ln>
+        </p:spPr>
+        <p:style>
+          <a:lnRef idx="2">
+            <a:schemeClr val="accent1">
+              <a:shade val="15000"/>
+            </a:schemeClr>
+          </a:lnRef>
+          <a:fillRef idx="1">
+            <a:schemeClr val="accent1"/>
+          </a:fillRef>
+          <a:effectRef idx="0">
+            <a:schemeClr val="accent1"/>
+          </a:effectRef>
+          <a:fontRef idx="minor">
+            <a:schemeClr val="lt1"/>
+          </a:fontRef>
+        </p:style>
+        <p:txBody>
+          <a:bodyPr rtlCol="0" anchor="ctr"/>
+          <a:lstStyle/>
+          <a:p>
+            <a:pPr algn="ctr"/>
+            <a:endParaRPr lang="de-AT" dirty="0"/>
+          </a:p>
+        </p:txBody>
+      </p:sp>
+      <p:sp>
+        <p:nvSpPr>
+          <p:cNvPr id="19" name="Rechteck: abgerundete Ecken 18">
+            <a:extLst>
+              <a:ext uri="{FF2B5EF4-FFF2-40B4-BE49-F238E27FC236}">
+                <a16:creationId xmlns:a16="http://schemas.microsoft.com/office/drawing/2014/main" id="{364ACAC2-BBE0-F901-3A82-556719BE85D7}"/>
+              </a:ext>
+            </a:extLst>
+          </p:cNvPr>
+          <p:cNvSpPr/>
+          <p:nvPr/>
+        </p:nvSpPr>
+        <p:spPr>
+          <a:xfrm>
+            <a:off x="7216878" y="5836808"/>
+            <a:ext cx="1809135" cy="331839"/>
+          </a:xfrm>
+          <a:prstGeom prst="roundRect">
+            <a:avLst/>
+          </a:prstGeom>
+          <a:noFill/>
+          <a:ln w="28575">
+            <a:solidFill>
+              <a:srgbClr val="00B050"/>
+            </a:solidFill>
+          </a:ln>
+        </p:spPr>
+        <p:style>
+          <a:lnRef idx="2">
+            <a:schemeClr val="accent1">
+              <a:shade val="15000"/>
+            </a:schemeClr>
+          </a:lnRef>
+          <a:fillRef idx="1">
+            <a:schemeClr val="accent1"/>
+          </a:fillRef>
+          <a:effectRef idx="0">
+            <a:schemeClr val="accent1"/>
+          </a:effectRef>
+          <a:fontRef idx="minor">
+            <a:schemeClr val="lt1"/>
+          </a:fontRef>
+        </p:style>
+        <p:txBody>
+          <a:bodyPr rtlCol="0" anchor="ctr"/>
+          <a:lstStyle/>
+          <a:p>
+            <a:pPr algn="ctr"/>
+            <a:endParaRPr lang="de-AT" dirty="0"/>
+          </a:p>
+        </p:txBody>
+      </p:sp>
+    </p:spTree>
+    <p:extLst>
+      <p:ext uri="{BB962C8B-B14F-4D97-AF65-F5344CB8AC3E}">
+        <p14:creationId xmlns:p14="http://schemas.microsoft.com/office/powerpoint/2010/main" val="128262050"/>
+      </p:ext>
+    </p:extLst>
+  </p:cSld>
+  <p:clrMapOvr>
+    <a:masterClrMapping/>
+  </p:clrMapOvr>
+  <p:timing>
+    <p:tnLst>
+      <p:par>
+        <p:cTn id="1" dur="indefinite" restart="never" nodeType="tmRoot">
+          <p:childTnLst>
+            <p:seq concurrent="1" nextAc="seek">
+              <p:cTn id="2" dur="indefinite" nodeType="mainSeq">
+                <p:childTnLst>
+                  <p:par>
+                    <p:cTn id="3" fill="hold">
+                      <p:stCondLst>
+                        <p:cond delay="indefinite"/>
+                      </p:stCondLst>
+                      <p:childTnLst>
+                        <p:par>
+                          <p:cTn id="4" fill="hold">
+                            <p:stCondLst>
+                              <p:cond delay="0"/>
+                            </p:stCondLst>
+                            <p:childTnLst>
+                              <p:par>
+                                <p:cTn id="5" presetID="1" presetClass="entr" presetSubtype="0" fill="hold" grpId="0" nodeType="clickEffect">
+                                  <p:stCondLst>
+                                    <p:cond delay="0"/>
+                                  </p:stCondLst>
+                                  <p:childTnLst>
+                                    <p:set>
+                                      <p:cBhvr>
+                                        <p:cTn id="6" dur="1" fill="hold">
+                                          <p:stCondLst>
+                                            <p:cond delay="0"/>
+                                          </p:stCondLst>
+                                        </p:cTn>
+                                        <p:tgtEl>
+                                          <p:spTgt spid="9"/>
+                                        </p:tgtEl>
+                                        <p:attrNameLst>
+                                          <p:attrName>style.visibility</p:attrName>
+                                        </p:attrNameLst>
+                                      </p:cBhvr>
+                                      <p:to>
+                                        <p:strVal val="visible"/>
+                                      </p:to>
+                                    </p:set>
+                                  </p:childTnLst>
+                                </p:cTn>
+                              </p:par>
+                            </p:childTnLst>
+                          </p:cTn>
+                        </p:par>
+                      </p:childTnLst>
+                    </p:cTn>
+                  </p:par>
+                  <p:par>
+                    <p:cTn id="7" fill="hold">
+                      <p:stCondLst>
+                        <p:cond delay="indefinite"/>
+                      </p:stCondLst>
+                      <p:childTnLst>
+                        <p:par>
+                          <p:cTn id="8" fill="hold">
+                            <p:stCondLst>
+                              <p:cond delay="0"/>
+                            </p:stCondLst>
+                            <p:childTnLst>
+                              <p:par>
+                                <p:cTn id="9" presetID="1" presetClass="entr" presetSubtype="0" fill="hold" grpId="0" nodeType="clickEffect">
+                                  <p:stCondLst>
+                                    <p:cond delay="0"/>
+                                  </p:stCondLst>
+                                  <p:childTnLst>
+                                    <p:set>
+                                      <p:cBhvr>
+                                        <p:cTn id="10" dur="1" fill="hold">
+                                          <p:stCondLst>
+                                            <p:cond delay="0"/>
+                                          </p:stCondLst>
+                                        </p:cTn>
+                                        <p:tgtEl>
+                                          <p:spTgt spid="15"/>
+                                        </p:tgtEl>
+                                        <p:attrNameLst>
+                                          <p:attrName>style.visibility</p:attrName>
+                                        </p:attrNameLst>
+                                      </p:cBhvr>
+                                      <p:to>
+                                        <p:strVal val="visible"/>
+                                      </p:to>
+                                    </p:set>
+                                  </p:childTnLst>
+                                </p:cTn>
+                              </p:par>
+                              <p:par>
+                                <p:cTn id="11" presetID="1" presetClass="entr" presetSubtype="0" fill="hold" grpId="0" nodeType="withEffect">
+                                  <p:stCondLst>
+                                    <p:cond delay="0"/>
+                                  </p:stCondLst>
+                                  <p:childTnLst>
+                                    <p:set>
+                                      <p:cBhvr>
+                                        <p:cTn id="12" dur="1" fill="hold">
+                                          <p:stCondLst>
+                                            <p:cond delay="0"/>
+                                          </p:stCondLst>
+                                        </p:cTn>
+                                        <p:tgtEl>
+                                          <p:spTgt spid="12"/>
+                                        </p:tgtEl>
+                                        <p:attrNameLst>
+                                          <p:attrName>style.visibility</p:attrName>
+                                        </p:attrNameLst>
+                                      </p:cBhvr>
+                                      <p:to>
+                                        <p:strVal val="visible"/>
+                                      </p:to>
+                                    </p:set>
+                                  </p:childTnLst>
+                                </p:cTn>
+                              </p:par>
+                              <p:par>
+                                <p:cTn id="13" presetID="1" presetClass="entr" presetSubtype="0" fill="hold" grpId="0" nodeType="withEffect">
+                                  <p:stCondLst>
+                                    <p:cond delay="0"/>
+                                  </p:stCondLst>
+                                  <p:childTnLst>
+                                    <p:set>
+                                      <p:cBhvr>
+                                        <p:cTn id="14" dur="1" fill="hold">
+                                          <p:stCondLst>
+                                            <p:cond delay="0"/>
+                                          </p:stCondLst>
+                                        </p:cTn>
+                                        <p:tgtEl>
+                                          <p:spTgt spid="11"/>
+                                        </p:tgtEl>
+                                        <p:attrNameLst>
+                                          <p:attrName>style.visibility</p:attrName>
+                                        </p:attrNameLst>
+                                      </p:cBhvr>
+                                      <p:to>
+                                        <p:strVal val="visible"/>
+                                      </p:to>
+                                    </p:set>
+                                  </p:childTnLst>
+                                </p:cTn>
+                              </p:par>
+                              <p:par>
+                                <p:cTn id="15" presetID="1" presetClass="entr" presetSubtype="0" fill="hold" grpId="0" nodeType="withEffect">
+                                  <p:stCondLst>
+                                    <p:cond delay="0"/>
+                                  </p:stCondLst>
+                                  <p:childTnLst>
+                                    <p:set>
+                                      <p:cBhvr>
+                                        <p:cTn id="16" dur="1" fill="hold">
+                                          <p:stCondLst>
+                                            <p:cond delay="0"/>
+                                          </p:stCondLst>
+                                        </p:cTn>
+                                        <p:tgtEl>
+                                          <p:spTgt spid="10"/>
+                                        </p:tgtEl>
+                                        <p:attrNameLst>
+                                          <p:attrName>style.visibility</p:attrName>
+                                        </p:attrNameLst>
+                                      </p:cBhvr>
+                                      <p:to>
+                                        <p:strVal val="visible"/>
+                                      </p:to>
+                                    </p:set>
+                                  </p:childTnLst>
+                                </p:cTn>
+                              </p:par>
+                            </p:childTnLst>
+                          </p:cTn>
+                        </p:par>
+                      </p:childTnLst>
+                    </p:cTn>
+                  </p:par>
+                  <p:par>
+                    <p:cTn id="17" fill="hold">
+                      <p:stCondLst>
+                        <p:cond delay="indefinite"/>
+                      </p:stCondLst>
+                      <p:childTnLst>
+                        <p:par>
+                          <p:cTn id="18" fill="hold">
+                            <p:stCondLst>
+                              <p:cond delay="0"/>
+                            </p:stCondLst>
+                            <p:childTnLst>
+                              <p:par>
+                                <p:cTn id="19" presetID="1" presetClass="entr" presetSubtype="0" fill="hold" grpId="0" nodeType="clickEffect">
+                                  <p:stCondLst>
+                                    <p:cond delay="0"/>
+                                  </p:stCondLst>
+                                  <p:childTnLst>
+                                    <p:set>
+                                      <p:cBhvr>
+                                        <p:cTn id="20" dur="1" fill="hold">
+                                          <p:stCondLst>
+                                            <p:cond delay="0"/>
+                                          </p:stCondLst>
+                                        </p:cTn>
+                                        <p:tgtEl>
+                                          <p:spTgt spid="18"/>
+                                        </p:tgtEl>
+                                        <p:attrNameLst>
+                                          <p:attrName>style.visibility</p:attrName>
+                                        </p:attrNameLst>
+                                      </p:cBhvr>
+                                      <p:to>
+                                        <p:strVal val="visible"/>
+                                      </p:to>
+                                    </p:set>
+                                  </p:childTnLst>
+                                </p:cTn>
+                              </p:par>
+                            </p:childTnLst>
+                          </p:cTn>
+                        </p:par>
+                      </p:childTnLst>
+                    </p:cTn>
+                  </p:par>
+                  <p:par>
+                    <p:cTn id="21" fill="hold">
+                      <p:stCondLst>
+                        <p:cond delay="indefinite"/>
+                      </p:stCondLst>
+                      <p:childTnLst>
+                        <p:par>
+                          <p:cTn id="22" fill="hold">
+                            <p:stCondLst>
+                              <p:cond delay="0"/>
+                            </p:stCondLst>
+                            <p:childTnLst>
+                              <p:par>
+                                <p:cTn id="23" presetID="1" presetClass="entr" presetSubtype="0" fill="hold" grpId="0" nodeType="clickEffect">
+                                  <p:stCondLst>
+                                    <p:cond delay="0"/>
+                                  </p:stCondLst>
+                                  <p:childTnLst>
+                                    <p:set>
+                                      <p:cBhvr>
+                                        <p:cTn id="24" dur="1" fill="hold">
+                                          <p:stCondLst>
+                                            <p:cond delay="0"/>
+                                          </p:stCondLst>
+                                        </p:cTn>
+                                        <p:tgtEl>
+                                          <p:spTgt spid="19"/>
+                                        </p:tgtEl>
+                                        <p:attrNameLst>
+                                          <p:attrName>style.visibility</p:attrName>
+                                        </p:attrNameLst>
+                                      </p:cBhvr>
+                                      <p:to>
+                                        <p:strVal val="visible"/>
+                                      </p:to>
+                                    </p:set>
+                                  </p:childTnLst>
+                                </p:cTn>
+                              </p:par>
+                            </p:childTnLst>
+                          </p:cTn>
+                        </p:par>
+                      </p:childTnLst>
+                    </p:cTn>
+                  </p:par>
+                </p:childTnLst>
+              </p:cTn>
+              <p:prevCondLst>
+                <p:cond evt="onPrev" delay="0">
+                  <p:tgtEl>
+                    <p:sldTgt/>
+                  </p:tgtEl>
+                </p:cond>
+              </p:prevCondLst>
+              <p:nextCondLst>
+                <p:cond evt="onNext" delay="0">
+                  <p:tgtEl>
+                    <p:sldTgt/>
+                  </p:tgtEl>
+                </p:cond>
+              </p:nextCondLst>
+            </p:seq>
+          </p:childTnLst>
+        </p:cTn>
+      </p:par>
+    </p:tnLst>
+    <p:bldLst>
+      <p:bldP spid="9" grpId="0" animBg="1"/>
+      <p:bldP spid="10" grpId="0" animBg="1"/>
+      <p:bldP spid="11" grpId="0" animBg="1"/>
+      <p:bldP spid="12" grpId="0" animBg="1"/>
+      <p:bldP spid="15" grpId="0" animBg="1"/>
+      <p:bldP spid="18" grpId="0" animBg="1"/>
+      <p:bldP spid="19" grpId="0" animBg="1"/>
+    </p:bldLst>
+  </p:timing>
+</p:sld>
+</file>
+
+<file path=ppt/slides/slide4.xml><?xml version="1.0" encoding="utf-8"?>
+<p:sld xmlns:a="http://schemas.openxmlformats.org/drawingml/2006/main" xmlns:r="http://schemas.openxmlformats.org/officeDocument/2006/relationships" xmlns:p="http://schemas.openxmlformats.org/presentationml/2006/main">
+  <p:cSld>
+    <p:spTree>
+      <p:nvGrpSpPr>
+        <p:cNvPr id="1" name="">
+          <a:extLst>
+            <a:ext uri="{FF2B5EF4-FFF2-40B4-BE49-F238E27FC236}">
+              <a16:creationId xmlns:a16="http://schemas.microsoft.com/office/drawing/2014/main" id="{980FD6F3-21A5-1B54-1B8B-535A00D02DBF}"/>
+            </a:ext>
+          </a:extLst>
+        </p:cNvPr>
+        <p:cNvGrpSpPr/>
+        <p:nvPr/>
+      </p:nvGrpSpPr>
+      <p:grpSpPr>
+        <a:xfrm>
+          <a:off x="0" y="0"/>
+          <a:ext cx="0" cy="0"/>
+          <a:chOff x="0" y="0"/>
+          <a:chExt cx="0" cy="0"/>
+        </a:xfrm>
+      </p:grpSpPr>
+      <p:sp>
+        <p:nvSpPr>
+          <p:cNvPr id="4" name="Titel 3">
+            <a:extLst>
+              <a:ext uri="{FF2B5EF4-FFF2-40B4-BE49-F238E27FC236}">
+                <a16:creationId xmlns:a16="http://schemas.microsoft.com/office/drawing/2014/main" id="{D9D6BD45-AD77-9F3B-1971-722E46FCEA7E}"/>
+              </a:ext>
+            </a:extLst>
+          </p:cNvPr>
+          <p:cNvSpPr>
+            <a:spLocks noGrp="1"/>
+          </p:cNvSpPr>
+          <p:nvPr>
+            <p:ph type="title"/>
+          </p:nvPr>
+        </p:nvSpPr>
+        <p:spPr>
+          <a:xfrm>
+            <a:off x="0" y="68197"/>
+            <a:ext cx="10515600" cy="706131"/>
+          </a:xfrm>
+        </p:spPr>
+        <p:txBody>
+          <a:bodyPr/>
+          <a:lstStyle/>
+          <a:p>
+            <a:r>
+              <a:rPr lang="de-DE" dirty="0" err="1"/>
+              <a:t>Packaging</a:t>
+            </a:r>
+            <a:r>
+              <a:rPr lang="de-DE" dirty="0"/>
+              <a:t> </a:t>
+            </a:r>
+            <a:r>
+              <a:rPr lang="de-DE" dirty="0" err="1"/>
+              <a:t>the</a:t>
+            </a:r>
+            <a:r>
+              <a:rPr lang="de-DE" dirty="0"/>
+              <a:t> </a:t>
+            </a:r>
+            <a:r>
+              <a:rPr lang="de-DE" dirty="0" err="1"/>
+              <a:t>project</a:t>
+            </a:r>
+            <a:r>
+              <a:rPr lang="de-DE" dirty="0"/>
+              <a:t>: </a:t>
+            </a:r>
+            <a:r>
+              <a:rPr lang="de-DE" dirty="0" err="1"/>
+              <a:t>pyproject.toml</a:t>
+            </a:r>
+            <a:endParaRPr lang="en-GB" dirty="0"/>
+          </a:p>
+        </p:txBody>
+      </p:sp>
+      <p:pic>
+        <p:nvPicPr>
+          <p:cNvPr id="3" name="Grafik 2">
+            <a:extLst>
+              <a:ext uri="{FF2B5EF4-FFF2-40B4-BE49-F238E27FC236}">
+                <a16:creationId xmlns:a16="http://schemas.microsoft.com/office/drawing/2014/main" id="{4DDC0FCF-EE3F-7C45-A4B4-8692DB1A4538}"/>
+              </a:ext>
+            </a:extLst>
+          </p:cNvPr>
+          <p:cNvPicPr>
+            <a:picLocks noChangeAspect="1"/>
+          </p:cNvPicPr>
+          <p:nvPr/>
+        </p:nvPicPr>
+        <p:blipFill>
+          <a:blip r:embed="rId2"/>
+          <a:stretch>
+            <a:fillRect/>
+          </a:stretch>
+        </p:blipFill>
+        <p:spPr>
+          <a:xfrm>
+            <a:off x="285135" y="709626"/>
+            <a:ext cx="11621729" cy="6148374"/>
+          </a:xfrm>
+          <a:prstGeom prst="rect">
+            <a:avLst/>
+          </a:prstGeom>
+        </p:spPr>
+      </p:pic>
+      <p:grpSp>
+        <p:nvGrpSpPr>
+          <p:cNvPr id="12" name="Gruppieren 11">
+            <a:extLst>
+              <a:ext uri="{FF2B5EF4-FFF2-40B4-BE49-F238E27FC236}">
+                <a16:creationId xmlns:a16="http://schemas.microsoft.com/office/drawing/2014/main" id="{528AEFD4-63F1-2A99-6794-2B3E9761DDBA}"/>
+              </a:ext>
+            </a:extLst>
+          </p:cNvPr>
+          <p:cNvGrpSpPr/>
+          <p:nvPr/>
+        </p:nvGrpSpPr>
+        <p:grpSpPr>
+          <a:xfrm>
+            <a:off x="182201" y="639097"/>
+            <a:ext cx="7077700" cy="993058"/>
+            <a:chOff x="182201" y="639097"/>
+            <a:chExt cx="7077700" cy="993058"/>
+          </a:xfrm>
+        </p:grpSpPr>
+        <p:sp>
+          <p:nvSpPr>
+            <p:cNvPr id="17" name="Rechteck: abgerundete Ecken 16">
+              <a:extLst>
+                <a:ext uri="{FF2B5EF4-FFF2-40B4-BE49-F238E27FC236}">
+                  <a16:creationId xmlns:a16="http://schemas.microsoft.com/office/drawing/2014/main" id="{71D30555-0A0C-5C4B-2E4E-762703D2803B}"/>
+                </a:ext>
+              </a:extLst>
+            </p:cNvPr>
+            <p:cNvSpPr/>
+            <p:nvPr/>
+          </p:nvSpPr>
+          <p:spPr>
+            <a:xfrm>
+              <a:off x="182201" y="639097"/>
+              <a:ext cx="4950238" cy="993058"/>
+            </a:xfrm>
+            <a:prstGeom prst="roundRect">
+              <a:avLst>
+                <a:gd name="adj" fmla="val 10726"/>
+              </a:avLst>
+            </a:prstGeom>
+            <a:noFill/>
+            <a:ln w="38100">
+              <a:solidFill>
+                <a:srgbClr val="FF0000"/>
+              </a:solidFill>
+            </a:ln>
+          </p:spPr>
+          <p:style>
+            <a:lnRef idx="2">
+              <a:schemeClr val="accent1">
+                <a:shade val="15000"/>
+              </a:schemeClr>
+            </a:lnRef>
+            <a:fillRef idx="1">
+              <a:schemeClr val="accent1"/>
+            </a:fillRef>
+            <a:effectRef idx="0">
+              <a:schemeClr val="accent1"/>
+            </a:effectRef>
+            <a:fontRef idx="minor">
+              <a:schemeClr val="lt1"/>
+            </a:fontRef>
+          </p:style>
+          <p:txBody>
+            <a:bodyPr rtlCol="0" anchor="ctr"/>
+            <a:lstStyle/>
+            <a:p>
+              <a:pPr algn="ctr"/>
+              <a:endParaRPr lang="de-AT" dirty="0"/>
+            </a:p>
+          </p:txBody>
+        </p:sp>
+        <p:sp>
+          <p:nvSpPr>
+            <p:cNvPr id="6" name="Textfeld 5">
+              <a:extLst>
+                <a:ext uri="{FF2B5EF4-FFF2-40B4-BE49-F238E27FC236}">
+                  <a16:creationId xmlns:a16="http://schemas.microsoft.com/office/drawing/2014/main" id="{D97D9DDA-F310-17DE-F226-FD6B3A3C10AA}"/>
+                </a:ext>
+              </a:extLst>
+            </p:cNvPr>
+            <p:cNvSpPr txBox="1"/>
+            <p:nvPr/>
+          </p:nvSpPr>
+          <p:spPr>
+            <a:xfrm>
+              <a:off x="5235373" y="926283"/>
+              <a:ext cx="2024528" cy="584775"/>
+            </a:xfrm>
+            <a:prstGeom prst="rect">
+              <a:avLst/>
+            </a:prstGeom>
+            <a:noFill/>
+          </p:spPr>
+          <p:txBody>
+            <a:bodyPr wrap="square" rtlCol="0">
+              <a:spAutoFit/>
+            </a:bodyPr>
+            <a:lstStyle/>
+            <a:p>
+              <a:r>
+                <a:rPr lang="en-US" sz="3200" b="1" dirty="0">
+                  <a:solidFill>
+                    <a:srgbClr val="FF0000"/>
+                  </a:solidFill>
+                </a:rPr>
+                <a:t>PEP 518</a:t>
+              </a:r>
+            </a:p>
+          </p:txBody>
+        </p:sp>
+      </p:grpSp>
+      <p:grpSp>
+        <p:nvGrpSpPr>
+          <p:cNvPr id="11" name="Gruppieren 10">
+            <a:extLst>
+              <a:ext uri="{FF2B5EF4-FFF2-40B4-BE49-F238E27FC236}">
+                <a16:creationId xmlns:a16="http://schemas.microsoft.com/office/drawing/2014/main" id="{744C206E-DFA5-4A50-CCF2-00D86B8AB29A}"/>
+              </a:ext>
+            </a:extLst>
+          </p:cNvPr>
+          <p:cNvGrpSpPr/>
+          <p:nvPr/>
+        </p:nvGrpSpPr>
+        <p:grpSpPr>
+          <a:xfrm>
+            <a:off x="182201" y="1777054"/>
+            <a:ext cx="11832818" cy="2342661"/>
+            <a:chOff x="182201" y="1777054"/>
+            <a:chExt cx="11832818" cy="2342661"/>
+          </a:xfrm>
+        </p:grpSpPr>
+        <p:sp>
+          <p:nvSpPr>
+            <p:cNvPr id="5" name="Rechteck: abgerundete Ecken 4">
+              <a:extLst>
+                <a:ext uri="{FF2B5EF4-FFF2-40B4-BE49-F238E27FC236}">
+                  <a16:creationId xmlns:a16="http://schemas.microsoft.com/office/drawing/2014/main" id="{AB6693B2-F89E-EC13-CF25-1D6BC92791AA}"/>
+                </a:ext>
+              </a:extLst>
+            </p:cNvPr>
+            <p:cNvSpPr/>
+            <p:nvPr/>
+          </p:nvSpPr>
+          <p:spPr>
+            <a:xfrm>
+              <a:off x="182201" y="1777054"/>
+              <a:ext cx="11832818" cy="2342661"/>
+            </a:xfrm>
+            <a:prstGeom prst="roundRect">
+              <a:avLst>
+                <a:gd name="adj" fmla="val 7853"/>
+              </a:avLst>
+            </a:prstGeom>
+            <a:noFill/>
+            <a:ln w="38100">
+              <a:solidFill>
+                <a:srgbClr val="FF0000"/>
+              </a:solidFill>
+            </a:ln>
+          </p:spPr>
+          <p:style>
+            <a:lnRef idx="2">
+              <a:schemeClr val="accent1">
+                <a:shade val="15000"/>
+              </a:schemeClr>
+            </a:lnRef>
+            <a:fillRef idx="1">
+              <a:schemeClr val="accent1"/>
+            </a:fillRef>
+            <a:effectRef idx="0">
+              <a:schemeClr val="accent1"/>
+            </a:effectRef>
+            <a:fontRef idx="minor">
+              <a:schemeClr val="lt1"/>
+            </a:fontRef>
+          </p:style>
+          <p:txBody>
+            <a:bodyPr rtlCol="0" anchor="ctr"/>
+            <a:lstStyle/>
+            <a:p>
+              <a:pPr algn="ctr"/>
+              <a:endParaRPr lang="de-AT" dirty="0"/>
+            </a:p>
+          </p:txBody>
+        </p:sp>
+        <p:sp>
+          <p:nvSpPr>
+            <p:cNvPr id="7" name="Textfeld 6">
+              <a:extLst>
+                <a:ext uri="{FF2B5EF4-FFF2-40B4-BE49-F238E27FC236}">
+                  <a16:creationId xmlns:a16="http://schemas.microsoft.com/office/drawing/2014/main" id="{9104F537-CBE0-C368-3B49-7C35D8D4333C}"/>
+                </a:ext>
+              </a:extLst>
+            </p:cNvPr>
+            <p:cNvSpPr txBox="1"/>
+            <p:nvPr/>
+          </p:nvSpPr>
+          <p:spPr>
+            <a:xfrm>
+              <a:off x="10254740" y="1777054"/>
+              <a:ext cx="1652124" cy="584775"/>
+            </a:xfrm>
+            <a:prstGeom prst="rect">
+              <a:avLst/>
+            </a:prstGeom>
+            <a:noFill/>
+          </p:spPr>
+          <p:txBody>
+            <a:bodyPr wrap="square" rtlCol="0">
+              <a:spAutoFit/>
+            </a:bodyPr>
+            <a:lstStyle/>
+            <a:p>
+              <a:r>
+                <a:rPr lang="en-US" sz="3200" b="1" dirty="0">
+                  <a:solidFill>
+                    <a:srgbClr val="FF0000"/>
+                  </a:solidFill>
+                </a:rPr>
+                <a:t>PEP 621</a:t>
+              </a:r>
+            </a:p>
+          </p:txBody>
+        </p:sp>
+      </p:grpSp>
+      <p:grpSp>
+        <p:nvGrpSpPr>
+          <p:cNvPr id="10" name="Gruppieren 9">
+            <a:extLst>
+              <a:ext uri="{FF2B5EF4-FFF2-40B4-BE49-F238E27FC236}">
+                <a16:creationId xmlns:a16="http://schemas.microsoft.com/office/drawing/2014/main" id="{247655F0-F952-15A0-E7E7-0565B1C684C7}"/>
+              </a:ext>
+            </a:extLst>
+          </p:cNvPr>
+          <p:cNvGrpSpPr/>
+          <p:nvPr/>
+        </p:nvGrpSpPr>
+        <p:grpSpPr>
+          <a:xfrm>
+            <a:off x="176980" y="4284278"/>
+            <a:ext cx="4812891" cy="2525189"/>
+            <a:chOff x="176980" y="4284278"/>
+            <a:chExt cx="4812891" cy="2525189"/>
+          </a:xfrm>
+        </p:grpSpPr>
+        <p:sp>
+          <p:nvSpPr>
+            <p:cNvPr id="8" name="Textfeld 7">
+              <a:extLst>
+                <a:ext uri="{FF2B5EF4-FFF2-40B4-BE49-F238E27FC236}">
+                  <a16:creationId xmlns:a16="http://schemas.microsoft.com/office/drawing/2014/main" id="{BD8DBCFD-26AB-A4AA-2C91-1B2D17612796}"/>
+                </a:ext>
+              </a:extLst>
+            </p:cNvPr>
+            <p:cNvSpPr txBox="1"/>
+            <p:nvPr/>
+          </p:nvSpPr>
+          <p:spPr>
+            <a:xfrm>
+              <a:off x="3337747" y="5254484"/>
+              <a:ext cx="1652124" cy="584775"/>
+            </a:xfrm>
+            <a:prstGeom prst="rect">
+              <a:avLst/>
+            </a:prstGeom>
+            <a:noFill/>
+            <a:ln>
+              <a:noFill/>
+            </a:ln>
+          </p:spPr>
+          <p:txBody>
+            <a:bodyPr wrap="square" rtlCol="0">
+              <a:spAutoFit/>
+            </a:bodyPr>
+            <a:lstStyle/>
+            <a:p>
+              <a:r>
+                <a:rPr lang="en-US" sz="3200" b="1" dirty="0">
+                  <a:solidFill>
+                    <a:srgbClr val="00B050"/>
+                  </a:solidFill>
+                </a:rPr>
+                <a:t>PEP 631</a:t>
+              </a:r>
+            </a:p>
+          </p:txBody>
+        </p:sp>
+        <p:sp>
+          <p:nvSpPr>
+            <p:cNvPr id="9" name="Rechteck: abgerundete Ecken 8">
+              <a:extLst>
+                <a:ext uri="{FF2B5EF4-FFF2-40B4-BE49-F238E27FC236}">
+                  <a16:creationId xmlns:a16="http://schemas.microsoft.com/office/drawing/2014/main" id="{237D07C5-1A23-878F-D992-9703FA771856}"/>
+                </a:ext>
+              </a:extLst>
+            </p:cNvPr>
+            <p:cNvSpPr/>
+            <p:nvPr/>
+          </p:nvSpPr>
+          <p:spPr>
+            <a:xfrm>
+              <a:off x="176980" y="4284278"/>
+              <a:ext cx="3160767" cy="2525189"/>
+            </a:xfrm>
+            <a:prstGeom prst="roundRect">
+              <a:avLst>
+                <a:gd name="adj" fmla="val 3902"/>
+              </a:avLst>
+            </a:prstGeom>
+            <a:noFill/>
+            <a:ln w="38100">
+              <a:solidFill>
+                <a:srgbClr val="00B050"/>
+              </a:solidFill>
+            </a:ln>
+          </p:spPr>
+          <p:style>
+            <a:lnRef idx="2">
+              <a:schemeClr val="accent1">
+                <a:shade val="15000"/>
+              </a:schemeClr>
+            </a:lnRef>
+            <a:fillRef idx="1">
+              <a:schemeClr val="accent1"/>
+            </a:fillRef>
+            <a:effectRef idx="0">
+              <a:schemeClr val="accent1"/>
+            </a:effectRef>
+            <a:fontRef idx="minor">
+              <a:schemeClr val="lt1"/>
+            </a:fontRef>
+          </p:style>
+          <p:txBody>
+            <a:bodyPr rtlCol="0" anchor="ctr"/>
+            <a:lstStyle/>
+            <a:p>
+              <a:pPr algn="ctr"/>
+              <a:endParaRPr lang="de-AT" dirty="0"/>
+            </a:p>
+          </p:txBody>
+        </p:sp>
+      </p:grpSp>
+    </p:spTree>
+    <p:extLst>
+      <p:ext uri="{BB962C8B-B14F-4D97-AF65-F5344CB8AC3E}">
+        <p14:creationId xmlns:p14="http://schemas.microsoft.com/office/powerpoint/2010/main" val="2110150452"/>
+      </p:ext>
+    </p:extLst>
+  </p:cSld>
+  <p:clrMapOvr>
+    <a:masterClrMapping/>
+  </p:clrMapOvr>
+  <p:timing>
+    <p:tnLst>
+      <p:par>
+        <p:cTn id="1" dur="indefinite" restart="never" nodeType="tmRoot">
+          <p:childTnLst>
+            <p:seq concurrent="1" nextAc="seek">
+              <p:cTn id="2" dur="indefinite" nodeType="mainSeq">
+                <p:childTnLst>
+                  <p:par>
+                    <p:cTn id="3" fill="hold">
+                      <p:stCondLst>
+                        <p:cond delay="indefinite"/>
+                      </p:stCondLst>
+                      <p:childTnLst>
+                        <p:par>
+                          <p:cTn id="4" fill="hold">
+                            <p:stCondLst>
+                              <p:cond delay="0"/>
+                            </p:stCondLst>
+                            <p:childTnLst>
+                              <p:par>
+                                <p:cTn id="5" presetID="1" presetClass="entr" presetSubtype="0" fill="hold" nodeType="clickEffect">
+                                  <p:stCondLst>
+                                    <p:cond delay="0"/>
+                                  </p:stCondLst>
+                                  <p:childTnLst>
+                                    <p:set>
+                                      <p:cBhvr>
+                                        <p:cTn id="6" dur="1" fill="hold">
+                                          <p:stCondLst>
+                                            <p:cond delay="0"/>
+                                          </p:stCondLst>
+                                        </p:cTn>
+                                        <p:tgtEl>
+                                          <p:spTgt spid="12"/>
+                                        </p:tgtEl>
+                                        <p:attrNameLst>
+                                          <p:attrName>style.visibility</p:attrName>
+                                        </p:attrNameLst>
+                                      </p:cBhvr>
+                                      <p:to>
+                                        <p:strVal val="visible"/>
+                                      </p:to>
+                                    </p:set>
+                                  </p:childTnLst>
+                                </p:cTn>
+                              </p:par>
+                            </p:childTnLst>
+                          </p:cTn>
+                        </p:par>
+                      </p:childTnLst>
+                    </p:cTn>
+                  </p:par>
+                  <p:par>
+                    <p:cTn id="7" fill="hold">
+                      <p:stCondLst>
+                        <p:cond delay="indefinite"/>
+                      </p:stCondLst>
+                      <p:childTnLst>
+                        <p:par>
+                          <p:cTn id="8" fill="hold">
+                            <p:stCondLst>
+                              <p:cond delay="0"/>
+                            </p:stCondLst>
+                            <p:childTnLst>
+                              <p:par>
+                                <p:cTn id="9" presetID="1" presetClass="entr" presetSubtype="0" fill="hold" nodeType="clickEffect">
+                                  <p:stCondLst>
+                                    <p:cond delay="0"/>
+                                  </p:stCondLst>
+                                  <p:childTnLst>
+                                    <p:set>
+                                      <p:cBhvr>
+                                        <p:cTn id="10" dur="1" fill="hold">
+                                          <p:stCondLst>
+                                            <p:cond delay="0"/>
+                                          </p:stCondLst>
+                                        </p:cTn>
+                                        <p:tgtEl>
+                                          <p:spTgt spid="11"/>
+                                        </p:tgtEl>
+                                        <p:attrNameLst>
+                                          <p:attrName>style.visibility</p:attrName>
+                                        </p:attrNameLst>
+                                      </p:cBhvr>
+                                      <p:to>
+                                        <p:strVal val="visible"/>
+                                      </p:to>
+                                    </p:set>
+                                  </p:childTnLst>
+                                </p:cTn>
+                              </p:par>
+                            </p:childTnLst>
+                          </p:cTn>
+                        </p:par>
+                      </p:childTnLst>
+                    </p:cTn>
+                  </p:par>
+                  <p:par>
+                    <p:cTn id="11" fill="hold">
+                      <p:stCondLst>
+                        <p:cond delay="indefinite"/>
+                      </p:stCondLst>
+                      <p:childTnLst>
+                        <p:par>
+                          <p:cTn id="12" fill="hold">
+                            <p:stCondLst>
+                              <p:cond delay="0"/>
+                            </p:stCondLst>
+                            <p:childTnLst>
+                              <p:par>
+                                <p:cTn id="13" presetID="1" presetClass="entr" presetSubtype="0" fill="hold" nodeType="clickEffect">
+                                  <p:stCondLst>
+                                    <p:cond delay="0"/>
+                                  </p:stCondLst>
+                                  <p:childTnLst>
+                                    <p:set>
+                                      <p:cBhvr>
+                                        <p:cTn id="14" dur="1" fill="hold">
+                                          <p:stCondLst>
+                                            <p:cond delay="0"/>
+                                          </p:stCondLst>
+                                        </p:cTn>
+                                        <p:tgtEl>
+                                          <p:spTgt spid="10"/>
+                                        </p:tgtEl>
+                                        <p:attrNameLst>
+                                          <p:attrName>style.visibility</p:attrName>
+                                        </p:attrNameLst>
+                                      </p:cBhvr>
+                                      <p:to>
+                                        <p:strVal val="visible"/>
+                                      </p:to>
+                                    </p:set>
+                                  </p:childTnLst>
+                                </p:cTn>
+                              </p:par>
+                            </p:childTnLst>
+                          </p:cTn>
+                        </p:par>
+                      </p:childTnLst>
+                    </p:cTn>
+                  </p:par>
+                </p:childTnLst>
+              </p:cTn>
+              <p:prevCondLst>
+                <p:cond evt="onPrev" delay="0">
+                  <p:tgtEl>
+                    <p:sldTgt/>
+                  </p:tgtEl>
+                </p:cond>
+              </p:prevCondLst>
+              <p:nextCondLst>
+                <p:cond evt="onNext" delay="0">
+                  <p:tgtEl>
+                    <p:sldTgt/>
+                  </p:tgtEl>
+                </p:cond>
+              </p:nextCondLst>
+            </p:seq>
+          </p:childTnLst>
+        </p:cTn>
+      </p:par>
+    </p:tnLst>
+  </p:timing>
 </p:sld>
 </file>
 
@@ -3856,10 +6870,10 @@
       </p:grpSpPr>
       <p:sp>
         <p:nvSpPr>
-          <p:cNvPr id="2" name="Titel 1">
-            <a:extLst>
-              <a:ext uri="{FF2B5EF4-FFF2-40B4-BE49-F238E27FC236}">
-                <a16:creationId xmlns:a16="http://schemas.microsoft.com/office/drawing/2014/main" id="{E43A81E0-494B-0DFC-D6A0-CF727041ED1F}"/>
+          <p:cNvPr id="4" name="Titel 3">
+            <a:extLst>
+              <a:ext uri="{FF2B5EF4-FFF2-40B4-BE49-F238E27FC236}">
+                <a16:creationId xmlns:a16="http://schemas.microsoft.com/office/drawing/2014/main" id="{A1F11745-60F8-F9E6-DE39-64814F034EAF}"/>
               </a:ext>
             </a:extLst>
           </p:cNvPr>
@@ -3877,41 +6891,51 @@
           <a:p>
             <a:r>
               <a:rPr lang="de-DE" dirty="0"/>
-              <a:t>Matrices</a:t>
+              <a:t>Workflows in GitHub Actions</a:t>
             </a:r>
             <a:endParaRPr lang="en-GB" dirty="0"/>
           </a:p>
         </p:txBody>
       </p:sp>
-      <p:sp>
-        <p:nvSpPr>
-          <p:cNvPr id="3" name="Inhaltsplatzhalter 2">
-            <a:extLst>
-              <a:ext uri="{FF2B5EF4-FFF2-40B4-BE49-F238E27FC236}">
-                <a16:creationId xmlns:a16="http://schemas.microsoft.com/office/drawing/2014/main" id="{82DD2402-8D32-90D0-442D-602DF8C27089}"/>
-              </a:ext>
-            </a:extLst>
-          </p:cNvPr>
-          <p:cNvSpPr>
-            <a:spLocks noGrp="1"/>
-          </p:cNvSpPr>
+      <p:pic>
+        <p:nvPicPr>
+          <p:cNvPr id="7" name="Inhaltsplatzhalter 6" descr="Ein Bild, das Text, Schrift, Zahl, Screenshot enthält.&#10;&#10;Automatisch generierte Beschreibung">
+            <a:extLst>
+              <a:ext uri="{FF2B5EF4-FFF2-40B4-BE49-F238E27FC236}">
+                <a16:creationId xmlns:a16="http://schemas.microsoft.com/office/drawing/2014/main" id="{1CCE5D11-C595-AE5D-1C76-13E7418FC604}"/>
+              </a:ext>
+            </a:extLst>
+          </p:cNvPr>
+          <p:cNvPicPr>
+            <a:picLocks noGrp="1" noChangeAspect="1"/>
+          </p:cNvPicPr>
           <p:nvPr>
             <p:ph idx="1"/>
           </p:nvPr>
-        </p:nvSpPr>
-        <p:spPr/>
-        <p:txBody>
-          <a:bodyPr/>
-          <a:lstStyle/>
-          <a:p>
-            <a:endParaRPr lang="en-GB" dirty="0"/>
-          </a:p>
-        </p:txBody>
-      </p:sp>
+        </p:nvPicPr>
+        <p:blipFill>
+          <a:blip r:embed="rId2">
+            <a:extLst>
+              <a:ext uri="{28A0092B-C50C-407E-A947-70E740481C1C}">
+                <a14:useLocalDpi xmlns:a14="http://schemas.microsoft.com/office/drawing/2010/main" val="0"/>
+              </a:ext>
+            </a:extLst>
+          </a:blip>
+          <a:stretch>
+            <a:fillRect/>
+          </a:stretch>
+        </p:blipFill>
+        <p:spPr>
+          <a:xfrm>
+            <a:off x="4284572" y="1423646"/>
+            <a:ext cx="7646873" cy="2676406"/>
+          </a:xfrm>
+        </p:spPr>
+      </p:pic>
     </p:spTree>
     <p:extLst>
       <p:ext uri="{BB962C8B-B14F-4D97-AF65-F5344CB8AC3E}">
-        <p14:creationId xmlns:p14="http://schemas.microsoft.com/office/powerpoint/2010/main" val="2408692993"/>
+        <p14:creationId xmlns:p14="http://schemas.microsoft.com/office/powerpoint/2010/main" val="1191672264"/>
       </p:ext>
     </p:extLst>
   </p:cSld>
@@ -3943,7 +6967,7 @@
           <p:cNvPr id="2" name="Titel 1">
             <a:extLst>
               <a:ext uri="{FF2B5EF4-FFF2-40B4-BE49-F238E27FC236}">
-                <a16:creationId xmlns:a16="http://schemas.microsoft.com/office/drawing/2014/main" id="{5D79C57D-7647-E2EA-B3EB-BEEFFDAF4A96}"/>
+                <a16:creationId xmlns:a16="http://schemas.microsoft.com/office/drawing/2014/main" id="{EE6370EC-8AF6-0183-9A5F-4AFB60AD2F18}"/>
               </a:ext>
             </a:extLst>
           </p:cNvPr>
@@ -3960,48 +6984,8 @@
           <a:lstStyle/>
           <a:p>
             <a:r>
-              <a:rPr lang="de-DE" dirty="0" err="1"/>
-              <a:t>Complications</a:t>
-            </a:r>
-            <a:r>
               <a:rPr lang="de-DE" dirty="0"/>
-              <a:t> </a:t>
-            </a:r>
-            <a:r>
-              <a:rPr lang="de-DE" dirty="0" err="1"/>
-              <a:t>that</a:t>
-            </a:r>
-            <a:r>
-              <a:rPr lang="de-DE" dirty="0"/>
-              <a:t> </a:t>
-            </a:r>
-            <a:r>
-              <a:rPr lang="de-DE" dirty="0" err="1"/>
-              <a:t>occurred</a:t>
-            </a:r>
-            <a:r>
-              <a:rPr lang="de-DE" dirty="0"/>
-              <a:t> </a:t>
-            </a:r>
-            <a:r>
-              <a:rPr lang="de-DE" dirty="0" err="1"/>
-              <a:t>when</a:t>
-            </a:r>
-            <a:r>
-              <a:rPr lang="de-DE" dirty="0"/>
-              <a:t> </a:t>
-            </a:r>
-            <a:r>
-              <a:rPr lang="de-DE" dirty="0" err="1"/>
-              <a:t>implementing</a:t>
-            </a:r>
-            <a:r>
-              <a:rPr lang="de-DE" dirty="0"/>
-              <a:t> </a:t>
-            </a:r>
-            <a:r>
-              <a:rPr lang="de-DE" dirty="0" err="1"/>
-              <a:t>this</a:t>
+              <a:t>YAML-files</a:t>
             </a:r>
             <a:endParaRPr lang="en-GB" dirty="0"/>
           </a:p>
@@ -4012,7 +6996,7 @@
           <p:cNvPr id="3" name="Inhaltsplatzhalter 2">
             <a:extLst>
               <a:ext uri="{FF2B5EF4-FFF2-40B4-BE49-F238E27FC236}">
-                <a16:creationId xmlns:a16="http://schemas.microsoft.com/office/drawing/2014/main" id="{48E692C7-F393-2D3A-9A20-6865065D1954}"/>
+                <a16:creationId xmlns:a16="http://schemas.microsoft.com/office/drawing/2014/main" id="{298ECA33-67E8-4928-CC34-40BA21B81888}"/>
               </a:ext>
             </a:extLst>
           </p:cNvPr>
@@ -4028,14 +7012,278 @@
           <a:bodyPr/>
           <a:lstStyle/>
           <a:p>
-            <a:endParaRPr lang="en-GB" dirty="0"/>
+            <a:endParaRPr lang="en-GB"/>
           </a:p>
         </p:txBody>
       </p:sp>
     </p:spTree>
     <p:extLst>
       <p:ext uri="{BB962C8B-B14F-4D97-AF65-F5344CB8AC3E}">
-        <p14:creationId xmlns:p14="http://schemas.microsoft.com/office/powerpoint/2010/main" val="2883837178"/>
+        <p14:creationId xmlns:p14="http://schemas.microsoft.com/office/powerpoint/2010/main" val="1556435296"/>
+      </p:ext>
+    </p:extLst>
+  </p:cSld>
+  <p:clrMapOvr>
+    <a:masterClrMapping/>
+  </p:clrMapOvr>
+</p:sld>
+</file>
+
+<file path=ppt/slides/slide7.xml><?xml version="1.0" encoding="utf-8"?>
+<p:sld xmlns:a="http://schemas.openxmlformats.org/drawingml/2006/main" xmlns:r="http://schemas.openxmlformats.org/officeDocument/2006/relationships" xmlns:p="http://schemas.openxmlformats.org/presentationml/2006/main">
+  <p:cSld>
+    <p:spTree>
+      <p:nvGrpSpPr>
+        <p:cNvPr id="1" name=""/>
+        <p:cNvGrpSpPr/>
+        <p:nvPr/>
+      </p:nvGrpSpPr>
+      <p:grpSpPr>
+        <a:xfrm>
+          <a:off x="0" y="0"/>
+          <a:ext cx="0" cy="0"/>
+          <a:chOff x="0" y="0"/>
+          <a:chExt cx="0" cy="0"/>
+        </a:xfrm>
+      </p:grpSpPr>
+      <p:sp>
+        <p:nvSpPr>
+          <p:cNvPr id="2" name="Titel 1">
+            <a:extLst>
+              <a:ext uri="{FF2B5EF4-FFF2-40B4-BE49-F238E27FC236}">
+                <a16:creationId xmlns:a16="http://schemas.microsoft.com/office/drawing/2014/main" id="{04002DA6-529C-560C-68FE-5D1848F88838}"/>
+              </a:ext>
+            </a:extLst>
+          </p:cNvPr>
+          <p:cNvSpPr>
+            <a:spLocks noGrp="1"/>
+          </p:cNvSpPr>
+          <p:nvPr>
+            <p:ph type="title"/>
+          </p:nvPr>
+        </p:nvSpPr>
+        <p:spPr/>
+        <p:txBody>
+          <a:bodyPr/>
+          <a:lstStyle/>
+          <a:p>
+            <a:r>
+              <a:rPr lang="de-DE" dirty="0" err="1"/>
+              <a:t>Usage</a:t>
+            </a:r>
+            <a:r>
+              <a:rPr lang="de-DE" dirty="0"/>
+              <a:t> </a:t>
+            </a:r>
+            <a:r>
+              <a:rPr lang="de-DE" dirty="0" err="1"/>
+              <a:t>of</a:t>
+            </a:r>
+            <a:r>
+              <a:rPr lang="de-DE" dirty="0"/>
+              <a:t> requirements.txt</a:t>
+            </a:r>
+            <a:endParaRPr lang="en-GB" dirty="0"/>
+          </a:p>
+        </p:txBody>
+      </p:sp>
+      <p:sp>
+        <p:nvSpPr>
+          <p:cNvPr id="3" name="Inhaltsplatzhalter 2">
+            <a:extLst>
+              <a:ext uri="{FF2B5EF4-FFF2-40B4-BE49-F238E27FC236}">
+                <a16:creationId xmlns:a16="http://schemas.microsoft.com/office/drawing/2014/main" id="{267DA300-AA58-841D-8EAF-1DA75F68400B}"/>
+              </a:ext>
+            </a:extLst>
+          </p:cNvPr>
+          <p:cNvSpPr>
+            <a:spLocks noGrp="1"/>
+          </p:cNvSpPr>
+          <p:nvPr>
+            <p:ph idx="1"/>
+          </p:nvPr>
+        </p:nvSpPr>
+        <p:spPr/>
+        <p:txBody>
+          <a:bodyPr/>
+          <a:lstStyle/>
+          <a:p>
+            <a:endParaRPr lang="en-GB"/>
+          </a:p>
+        </p:txBody>
+      </p:sp>
+    </p:spTree>
+    <p:extLst>
+      <p:ext uri="{BB962C8B-B14F-4D97-AF65-F5344CB8AC3E}">
+        <p14:creationId xmlns:p14="http://schemas.microsoft.com/office/powerpoint/2010/main" val="840400635"/>
+      </p:ext>
+    </p:extLst>
+  </p:cSld>
+  <p:clrMapOvr>
+    <a:masterClrMapping/>
+  </p:clrMapOvr>
+</p:sld>
+</file>
+
+<file path=ppt/slides/slide8.xml><?xml version="1.0" encoding="utf-8"?>
+<p:sld xmlns:a="http://schemas.openxmlformats.org/drawingml/2006/main" xmlns:r="http://schemas.openxmlformats.org/officeDocument/2006/relationships" xmlns:p="http://schemas.openxmlformats.org/presentationml/2006/main">
+  <p:cSld>
+    <p:spTree>
+      <p:nvGrpSpPr>
+        <p:cNvPr id="1" name=""/>
+        <p:cNvGrpSpPr/>
+        <p:nvPr/>
+      </p:nvGrpSpPr>
+      <p:grpSpPr>
+        <a:xfrm>
+          <a:off x="0" y="0"/>
+          <a:ext cx="0" cy="0"/>
+          <a:chOff x="0" y="0"/>
+          <a:chExt cx="0" cy="0"/>
+        </a:xfrm>
+      </p:grpSpPr>
+      <p:sp>
+        <p:nvSpPr>
+          <p:cNvPr id="2" name="Titel 1">
+            <a:extLst>
+              <a:ext uri="{FF2B5EF4-FFF2-40B4-BE49-F238E27FC236}">
+                <a16:creationId xmlns:a16="http://schemas.microsoft.com/office/drawing/2014/main" id="{4137F645-5DFC-30C6-1995-EA5E243D0982}"/>
+              </a:ext>
+            </a:extLst>
+          </p:cNvPr>
+          <p:cNvSpPr>
+            <a:spLocks noGrp="1"/>
+          </p:cNvSpPr>
+          <p:nvPr>
+            <p:ph type="title"/>
+          </p:nvPr>
+        </p:nvSpPr>
+        <p:spPr/>
+        <p:txBody>
+          <a:bodyPr/>
+          <a:lstStyle/>
+          <a:p>
+            <a:r>
+              <a:rPr lang="de-DE" dirty="0" err="1"/>
+              <a:t>Artifacts</a:t>
+            </a:r>
+            <a:endParaRPr lang="en-GB" dirty="0"/>
+          </a:p>
+        </p:txBody>
+      </p:sp>
+      <p:sp>
+        <p:nvSpPr>
+          <p:cNvPr id="3" name="Inhaltsplatzhalter 2">
+            <a:extLst>
+              <a:ext uri="{FF2B5EF4-FFF2-40B4-BE49-F238E27FC236}">
+                <a16:creationId xmlns:a16="http://schemas.microsoft.com/office/drawing/2014/main" id="{87A379A8-A4CA-D096-7AF6-C6ED68A528BB}"/>
+              </a:ext>
+            </a:extLst>
+          </p:cNvPr>
+          <p:cNvSpPr>
+            <a:spLocks noGrp="1"/>
+          </p:cNvSpPr>
+          <p:nvPr>
+            <p:ph idx="1"/>
+          </p:nvPr>
+        </p:nvSpPr>
+        <p:spPr/>
+        <p:txBody>
+          <a:bodyPr/>
+          <a:lstStyle/>
+          <a:p>
+            <a:endParaRPr lang="en-GB"/>
+          </a:p>
+        </p:txBody>
+      </p:sp>
+    </p:spTree>
+    <p:extLst>
+      <p:ext uri="{BB962C8B-B14F-4D97-AF65-F5344CB8AC3E}">
+        <p14:creationId xmlns:p14="http://schemas.microsoft.com/office/powerpoint/2010/main" val="2002680346"/>
+      </p:ext>
+    </p:extLst>
+  </p:cSld>
+  <p:clrMapOvr>
+    <a:masterClrMapping/>
+  </p:clrMapOvr>
+</p:sld>
+</file>
+
+<file path=ppt/slides/slide9.xml><?xml version="1.0" encoding="utf-8"?>
+<p:sld xmlns:a="http://schemas.openxmlformats.org/drawingml/2006/main" xmlns:r="http://schemas.openxmlformats.org/officeDocument/2006/relationships" xmlns:p="http://schemas.openxmlformats.org/presentationml/2006/main">
+  <p:cSld>
+    <p:spTree>
+      <p:nvGrpSpPr>
+        <p:cNvPr id="1" name=""/>
+        <p:cNvGrpSpPr/>
+        <p:nvPr/>
+      </p:nvGrpSpPr>
+      <p:grpSpPr>
+        <a:xfrm>
+          <a:off x="0" y="0"/>
+          <a:ext cx="0" cy="0"/>
+          <a:chOff x="0" y="0"/>
+          <a:chExt cx="0" cy="0"/>
+        </a:xfrm>
+      </p:grpSpPr>
+      <p:sp>
+        <p:nvSpPr>
+          <p:cNvPr id="2" name="Titel 1">
+            <a:extLst>
+              <a:ext uri="{FF2B5EF4-FFF2-40B4-BE49-F238E27FC236}">
+                <a16:creationId xmlns:a16="http://schemas.microsoft.com/office/drawing/2014/main" id="{E43A81E0-494B-0DFC-D6A0-CF727041ED1F}"/>
+              </a:ext>
+            </a:extLst>
+          </p:cNvPr>
+          <p:cNvSpPr>
+            <a:spLocks noGrp="1"/>
+          </p:cNvSpPr>
+          <p:nvPr>
+            <p:ph type="title"/>
+          </p:nvPr>
+        </p:nvSpPr>
+        <p:spPr/>
+        <p:txBody>
+          <a:bodyPr/>
+          <a:lstStyle/>
+          <a:p>
+            <a:r>
+              <a:rPr lang="de-DE" dirty="0"/>
+              <a:t>Matrices</a:t>
+            </a:r>
+            <a:endParaRPr lang="en-GB" dirty="0"/>
+          </a:p>
+        </p:txBody>
+      </p:sp>
+      <p:sp>
+        <p:nvSpPr>
+          <p:cNvPr id="3" name="Inhaltsplatzhalter 2">
+            <a:extLst>
+              <a:ext uri="{FF2B5EF4-FFF2-40B4-BE49-F238E27FC236}">
+                <a16:creationId xmlns:a16="http://schemas.microsoft.com/office/drawing/2014/main" id="{82DD2402-8D32-90D0-442D-602DF8C27089}"/>
+              </a:ext>
+            </a:extLst>
+          </p:cNvPr>
+          <p:cNvSpPr>
+            <a:spLocks noGrp="1"/>
+          </p:cNvSpPr>
+          <p:nvPr>
+            <p:ph idx="1"/>
+          </p:nvPr>
+        </p:nvSpPr>
+        <p:spPr/>
+        <p:txBody>
+          <a:bodyPr/>
+          <a:lstStyle/>
+          <a:p>
+            <a:endParaRPr lang="en-GB" dirty="0"/>
+          </a:p>
+        </p:txBody>
+      </p:sp>
+    </p:spTree>
+    <p:extLst>
+      <p:ext uri="{BB962C8B-B14F-4D97-AF65-F5344CB8AC3E}">
+        <p14:creationId xmlns:p14="http://schemas.microsoft.com/office/powerpoint/2010/main" val="2408692993"/>
       </p:ext>
     </p:extLst>
   </p:cSld>

</xml_diff>